<commit_message>
Report Tweet Sentiment Analysis
</commit_message>
<xml_diff>
--- a/EDA & Report Analysis/Report Tweet Sentiment Analysis.pptx
+++ b/EDA & Report Analysis/Report Tweet Sentiment Analysis.pptx
@@ -18,6 +18,7 @@
     <p:sldId id="266" r:id="rId34"/>
     <p:sldId id="267" r:id="rId35"/>
     <p:sldId id="268" r:id="rId36"/>
+    <p:sldId id="269" r:id="rId37"/>
   </p:sldIdLst>
   <p:sldSz cx="18288000" cy="10287000"/>
   <p:notesSz cx="6858000" cy="9144000"/>
@@ -3915,6 +3916,661 @@
           <p:nvPr/>
         </p:nvSpPr>
         <p:spPr>
+          <a:xfrm flipH="false" flipV="false" rot="1295726">
+            <a:off x="-5282231" y="-7243759"/>
+            <a:ext cx="16615040" cy="20806262"/>
+          </a:xfrm>
+          <a:custGeom>
+            <a:avLst/>
+            <a:gdLst/>
+            <a:ahLst/>
+            <a:cxnLst/>
+            <a:rect r="r" b="b" t="t" l="l"/>
+            <a:pathLst>
+              <a:path h="20806262" w="16615040">
+                <a:moveTo>
+                  <a:pt x="0" y="0"/>
+                </a:moveTo>
+                <a:lnTo>
+                  <a:pt x="16615040" y="0"/>
+                </a:lnTo>
+                <a:lnTo>
+                  <a:pt x="16615040" y="20806262"/>
+                </a:lnTo>
+                <a:lnTo>
+                  <a:pt x="0" y="20806262"/>
+                </a:lnTo>
+                <a:lnTo>
+                  <a:pt x="0" y="0"/>
+                </a:lnTo>
+                <a:close/>
+              </a:path>
+            </a:pathLst>
+          </a:custGeom>
+          <a:blipFill>
+            <a:blip r:embed="rId2">
+              <a:alphaModFix amt="9999"/>
+              <a:extLst>
+                <a:ext uri="{96DAC541-7B7A-43D3-8B79-37D633B846F1}">
+                  <asvg:svgBlip xmlns:asvg="http://schemas.microsoft.com/office/drawing/2016/SVG/main" r:embed="rId3"/>
+                </a:ext>
+              </a:extLst>
+            </a:blip>
+            <a:stretch>
+              <a:fillRect l="0" t="-2551" r="-21036" b="0"/>
+            </a:stretch>
+          </a:blipFill>
+        </p:spPr>
+      </p:sp>
+      <p:sp>
+        <p:nvSpPr>
+          <p:cNvPr name="AutoShape 3" id="3"/>
+          <p:cNvSpPr/>
+          <p:nvPr/>
+        </p:nvSpPr>
+        <p:spPr>
+          <a:xfrm>
+            <a:off x="2896207" y="4252390"/>
+            <a:ext cx="4559046" cy="0"/>
+          </a:xfrm>
+          <a:prstGeom prst="line">
+            <a:avLst/>
+          </a:prstGeom>
+          <a:ln cap="flat" w="9525">
+            <a:solidFill>
+              <a:srgbClr val="000000"/>
+            </a:solidFill>
+            <a:prstDash val="solid"/>
+            <a:headEnd type="none" len="sm" w="sm"/>
+            <a:tailEnd type="none" len="sm" w="sm"/>
+          </a:ln>
+        </p:spPr>
+      </p:sp>
+      <p:sp>
+        <p:nvSpPr>
+          <p:cNvPr name="AutoShape 4" id="4"/>
+          <p:cNvSpPr/>
+          <p:nvPr/>
+        </p:nvSpPr>
+        <p:spPr>
+          <a:xfrm>
+            <a:off x="10832747" y="4257152"/>
+            <a:ext cx="4559046" cy="0"/>
+          </a:xfrm>
+          <a:prstGeom prst="line">
+            <a:avLst/>
+          </a:prstGeom>
+          <a:ln cap="flat" w="9525">
+            <a:solidFill>
+              <a:srgbClr val="000000"/>
+            </a:solidFill>
+            <a:prstDash val="solid"/>
+            <a:headEnd type="none" len="sm" w="sm"/>
+            <a:tailEnd type="none" len="sm" w="sm"/>
+          </a:ln>
+        </p:spPr>
+      </p:sp>
+      <p:sp>
+        <p:nvSpPr>
+          <p:cNvPr name="Freeform 5" id="5"/>
+          <p:cNvSpPr/>
+          <p:nvPr/>
+        </p:nvSpPr>
+        <p:spPr>
+          <a:xfrm flipH="false" flipV="false" rot="0">
+            <a:off x="576481" y="482886"/>
+            <a:ext cx="2319725" cy="2100406"/>
+          </a:xfrm>
+          <a:custGeom>
+            <a:avLst/>
+            <a:gdLst/>
+            <a:ahLst/>
+            <a:cxnLst/>
+            <a:rect r="r" b="b" t="t" l="l"/>
+            <a:pathLst>
+              <a:path h="2100406" w="2319725">
+                <a:moveTo>
+                  <a:pt x="0" y="0"/>
+                </a:moveTo>
+                <a:lnTo>
+                  <a:pt x="2319726" y="0"/>
+                </a:lnTo>
+                <a:lnTo>
+                  <a:pt x="2319726" y="2100406"/>
+                </a:lnTo>
+                <a:lnTo>
+                  <a:pt x="0" y="2100406"/>
+                </a:lnTo>
+                <a:lnTo>
+                  <a:pt x="0" y="0"/>
+                </a:lnTo>
+                <a:close/>
+              </a:path>
+            </a:pathLst>
+          </a:custGeom>
+          <a:blipFill>
+            <a:blip r:embed="rId4">
+              <a:extLst>
+                <a:ext uri="{96DAC541-7B7A-43D3-8B79-37D633B846F1}">
+                  <asvg:svgBlip xmlns:asvg="http://schemas.microsoft.com/office/drawing/2016/SVG/main" r:embed="rId5"/>
+                </a:ext>
+              </a:extLst>
+            </a:blip>
+            <a:stretch>
+              <a:fillRect l="0" t="0" r="0" b="0"/>
+            </a:stretch>
+          </a:blipFill>
+        </p:spPr>
+      </p:sp>
+      <p:sp>
+        <p:nvSpPr>
+          <p:cNvPr name="Freeform 6" id="6"/>
+          <p:cNvSpPr/>
+          <p:nvPr/>
+        </p:nvSpPr>
+        <p:spPr>
+          <a:xfrm flipH="false" flipV="false" rot="0">
+            <a:off x="16227715" y="2117965"/>
+            <a:ext cx="2880184" cy="2864474"/>
+          </a:xfrm>
+          <a:custGeom>
+            <a:avLst/>
+            <a:gdLst/>
+            <a:ahLst/>
+            <a:cxnLst/>
+            <a:rect r="r" b="b" t="t" l="l"/>
+            <a:pathLst>
+              <a:path h="2864474" w="2880184">
+                <a:moveTo>
+                  <a:pt x="0" y="0"/>
+                </a:moveTo>
+                <a:lnTo>
+                  <a:pt x="2880184" y="0"/>
+                </a:lnTo>
+                <a:lnTo>
+                  <a:pt x="2880184" y="2864474"/>
+                </a:lnTo>
+                <a:lnTo>
+                  <a:pt x="0" y="2864474"/>
+                </a:lnTo>
+                <a:lnTo>
+                  <a:pt x="0" y="0"/>
+                </a:lnTo>
+                <a:close/>
+              </a:path>
+            </a:pathLst>
+          </a:custGeom>
+          <a:blipFill>
+            <a:blip r:embed="rId6">
+              <a:extLst>
+                <a:ext uri="{96DAC541-7B7A-43D3-8B79-37D633B846F1}">
+                  <asvg:svgBlip xmlns:asvg="http://schemas.microsoft.com/office/drawing/2016/SVG/main" r:embed="rId7"/>
+                </a:ext>
+              </a:extLst>
+            </a:blip>
+            <a:stretch>
+              <a:fillRect l="0" t="0" r="0" b="0"/>
+            </a:stretch>
+          </a:blipFill>
+        </p:spPr>
+      </p:sp>
+      <p:sp>
+        <p:nvSpPr>
+          <p:cNvPr name="Freeform 7" id="7"/>
+          <p:cNvSpPr/>
+          <p:nvPr/>
+        </p:nvSpPr>
+        <p:spPr>
+          <a:xfrm flipH="true" flipV="false" rot="0">
+            <a:off x="-908077" y="7106246"/>
+            <a:ext cx="4110337" cy="4114800"/>
+          </a:xfrm>
+          <a:custGeom>
+            <a:avLst/>
+            <a:gdLst/>
+            <a:ahLst/>
+            <a:cxnLst/>
+            <a:rect r="r" b="b" t="t" l="l"/>
+            <a:pathLst>
+              <a:path h="4114800" w="4110337">
+                <a:moveTo>
+                  <a:pt x="4110337" y="0"/>
+                </a:moveTo>
+                <a:lnTo>
+                  <a:pt x="0" y="0"/>
+                </a:lnTo>
+                <a:lnTo>
+                  <a:pt x="0" y="4114800"/>
+                </a:lnTo>
+                <a:lnTo>
+                  <a:pt x="4110337" y="4114800"/>
+                </a:lnTo>
+                <a:lnTo>
+                  <a:pt x="4110337" y="0"/>
+                </a:lnTo>
+                <a:close/>
+              </a:path>
+            </a:pathLst>
+          </a:custGeom>
+          <a:blipFill>
+            <a:blip r:embed="rId8">
+              <a:extLst>
+                <a:ext uri="{96DAC541-7B7A-43D3-8B79-37D633B846F1}">
+                  <asvg:svgBlip xmlns:asvg="http://schemas.microsoft.com/office/drawing/2016/SVG/main" r:embed="rId9"/>
+                </a:ext>
+              </a:extLst>
+            </a:blip>
+            <a:stretch>
+              <a:fillRect l="0" t="0" r="0" b="0"/>
+            </a:stretch>
+          </a:blipFill>
+        </p:spPr>
+      </p:sp>
+      <p:sp>
+        <p:nvSpPr>
+          <p:cNvPr name="Freeform 8" id="8"/>
+          <p:cNvSpPr/>
+          <p:nvPr/>
+        </p:nvSpPr>
+        <p:spPr>
+          <a:xfrm flipH="false" flipV="false" rot="0">
+            <a:off x="15391793" y="8747991"/>
+            <a:ext cx="2043047" cy="1020617"/>
+          </a:xfrm>
+          <a:custGeom>
+            <a:avLst/>
+            <a:gdLst/>
+            <a:ahLst/>
+            <a:cxnLst/>
+            <a:rect r="r" b="b" t="t" l="l"/>
+            <a:pathLst>
+              <a:path h="1020617" w="2043047">
+                <a:moveTo>
+                  <a:pt x="0" y="0"/>
+                </a:moveTo>
+                <a:lnTo>
+                  <a:pt x="2043048" y="0"/>
+                </a:lnTo>
+                <a:lnTo>
+                  <a:pt x="2043048" y="1020618"/>
+                </a:lnTo>
+                <a:lnTo>
+                  <a:pt x="0" y="1020618"/>
+                </a:lnTo>
+                <a:lnTo>
+                  <a:pt x="0" y="0"/>
+                </a:lnTo>
+                <a:close/>
+              </a:path>
+            </a:pathLst>
+          </a:custGeom>
+          <a:blipFill>
+            <a:blip r:embed="rId10">
+              <a:extLst>
+                <a:ext uri="{96DAC541-7B7A-43D3-8B79-37D633B846F1}">
+                  <asvg:svgBlip xmlns:asvg="http://schemas.microsoft.com/office/drawing/2016/SVG/main" r:embed="rId11"/>
+                </a:ext>
+              </a:extLst>
+            </a:blip>
+            <a:stretch>
+              <a:fillRect l="0" t="0" r="0" b="0"/>
+            </a:stretch>
+          </a:blipFill>
+        </p:spPr>
+      </p:sp>
+      <p:sp>
+        <p:nvSpPr>
+          <p:cNvPr name="Freeform 9" id="9"/>
+          <p:cNvSpPr/>
+          <p:nvPr/>
+        </p:nvSpPr>
+        <p:spPr>
+          <a:xfrm flipH="false" flipV="false" rot="0">
+            <a:off x="2461910" y="5143500"/>
+            <a:ext cx="5427639" cy="4756033"/>
+          </a:xfrm>
+          <a:custGeom>
+            <a:avLst/>
+            <a:gdLst/>
+            <a:ahLst/>
+            <a:cxnLst/>
+            <a:rect r="r" b="b" t="t" l="l"/>
+            <a:pathLst>
+              <a:path h="4756033" w="5427639">
+                <a:moveTo>
+                  <a:pt x="0" y="0"/>
+                </a:moveTo>
+                <a:lnTo>
+                  <a:pt x="5427639" y="0"/>
+                </a:lnTo>
+                <a:lnTo>
+                  <a:pt x="5427639" y="4756033"/>
+                </a:lnTo>
+                <a:lnTo>
+                  <a:pt x="0" y="4756033"/>
+                </a:lnTo>
+                <a:lnTo>
+                  <a:pt x="0" y="0"/>
+                </a:lnTo>
+                <a:close/>
+              </a:path>
+            </a:pathLst>
+          </a:custGeom>
+          <a:blipFill>
+            <a:blip r:embed="rId12"/>
+            <a:stretch>
+              <a:fillRect l="0" t="-2332" r="0" b="-2332"/>
+            </a:stretch>
+          </a:blipFill>
+        </p:spPr>
+      </p:sp>
+      <p:sp>
+        <p:nvSpPr>
+          <p:cNvPr name="Freeform 10" id="10"/>
+          <p:cNvSpPr/>
+          <p:nvPr/>
+        </p:nvSpPr>
+        <p:spPr>
+          <a:xfrm flipH="false" flipV="false" rot="0">
+            <a:off x="10330002" y="5143500"/>
+            <a:ext cx="5564537" cy="4961584"/>
+          </a:xfrm>
+          <a:custGeom>
+            <a:avLst/>
+            <a:gdLst/>
+            <a:ahLst/>
+            <a:cxnLst/>
+            <a:rect r="r" b="b" t="t" l="l"/>
+            <a:pathLst>
+              <a:path h="4961584" w="5564537">
+                <a:moveTo>
+                  <a:pt x="0" y="0"/>
+                </a:moveTo>
+                <a:lnTo>
+                  <a:pt x="5564537" y="0"/>
+                </a:lnTo>
+                <a:lnTo>
+                  <a:pt x="5564537" y="4961584"/>
+                </a:lnTo>
+                <a:lnTo>
+                  <a:pt x="0" y="4961584"/>
+                </a:lnTo>
+                <a:lnTo>
+                  <a:pt x="0" y="0"/>
+                </a:lnTo>
+                <a:close/>
+              </a:path>
+            </a:pathLst>
+          </a:custGeom>
+          <a:blipFill>
+            <a:blip r:embed="rId13"/>
+            <a:stretch>
+              <a:fillRect l="-1612" t="-156" r="-1153" b="0"/>
+            </a:stretch>
+          </a:blipFill>
+        </p:spPr>
+      </p:sp>
+      <p:sp>
+        <p:nvSpPr>
+          <p:cNvPr name="TextBox 11" id="11"/>
+          <p:cNvSpPr txBox="true"/>
+          <p:nvPr/>
+        </p:nvSpPr>
+        <p:spPr>
+          <a:xfrm rot="0">
+            <a:off x="3731361" y="300595"/>
+            <a:ext cx="10825278" cy="2858776"/>
+          </a:xfrm>
+          <a:prstGeom prst="rect">
+            <a:avLst/>
+          </a:prstGeom>
+        </p:spPr>
+        <p:txBody>
+          <a:bodyPr anchor="t" rtlCol="false" tIns="0" lIns="0" bIns="0" rIns="0">
+            <a:spAutoFit/>
+          </a:bodyPr>
+          <a:lstStyle/>
+          <a:p>
+            <a:pPr algn="ctr">
+              <a:lnSpc>
+                <a:spcPts val="7490"/>
+              </a:lnSpc>
+            </a:pPr>
+            <a:r>
+              <a:rPr lang="en-US" sz="7000">
+                <a:solidFill>
+                  <a:srgbClr val="3C3C3C"/>
+                </a:solidFill>
+                <a:latin typeface="Aileron Heavy"/>
+              </a:rPr>
+              <a:t>HASIL</a:t>
+            </a:r>
+          </a:p>
+          <a:p>
+            <a:pPr algn="ctr">
+              <a:lnSpc>
+                <a:spcPts val="7490"/>
+              </a:lnSpc>
+            </a:pPr>
+            <a:r>
+              <a:rPr lang="en-US" sz="7000">
+                <a:solidFill>
+                  <a:srgbClr val="3C3C3C"/>
+                </a:solidFill>
+                <a:latin typeface="Aileron Heavy"/>
+              </a:rPr>
+              <a:t>SENTIMENT </a:t>
+            </a:r>
+          </a:p>
+          <a:p>
+            <a:pPr algn="ctr">
+              <a:lnSpc>
+                <a:spcPts val="7490"/>
+              </a:lnSpc>
+            </a:pPr>
+            <a:r>
+              <a:rPr lang="en-US" sz="7000">
+                <a:solidFill>
+                  <a:srgbClr val="3C3C3C"/>
+                </a:solidFill>
+                <a:latin typeface="Aileron Heavy"/>
+              </a:rPr>
+              <a:t>ANALYSIS</a:t>
+            </a:r>
+          </a:p>
+        </p:txBody>
+      </p:sp>
+      <p:sp>
+        <p:nvSpPr>
+          <p:cNvPr name="TextBox 12" id="12"/>
+          <p:cNvSpPr txBox="true"/>
+          <p:nvPr/>
+        </p:nvSpPr>
+        <p:spPr>
+          <a:xfrm rot="0">
+            <a:off x="2654305" y="3550202"/>
+            <a:ext cx="5042850" cy="697425"/>
+          </a:xfrm>
+          <a:prstGeom prst="rect">
+            <a:avLst/>
+          </a:prstGeom>
+        </p:spPr>
+        <p:txBody>
+          <a:bodyPr anchor="t" rtlCol="false" tIns="0" lIns="0" bIns="0" rIns="0">
+            <a:spAutoFit/>
+          </a:bodyPr>
+          <a:lstStyle/>
+          <a:p>
+            <a:pPr algn="ctr">
+              <a:lnSpc>
+                <a:spcPts val="5400"/>
+              </a:lnSpc>
+            </a:pPr>
+            <a:r>
+              <a:rPr lang="en-US" sz="4576">
+                <a:solidFill>
+                  <a:srgbClr val="CA5E28"/>
+                </a:solidFill>
+                <a:latin typeface="Montserrat Classic Bold"/>
+              </a:rPr>
+              <a:t>MLP</a:t>
+            </a:r>
+          </a:p>
+        </p:txBody>
+      </p:sp>
+      <p:sp>
+        <p:nvSpPr>
+          <p:cNvPr name="TextBox 13" id="13"/>
+          <p:cNvSpPr txBox="true"/>
+          <p:nvPr/>
+        </p:nvSpPr>
+        <p:spPr>
+          <a:xfrm rot="0">
+            <a:off x="3025289" y="4444815"/>
+            <a:ext cx="4300881" cy="377825"/>
+          </a:xfrm>
+          <a:prstGeom prst="rect">
+            <a:avLst/>
+          </a:prstGeom>
+        </p:spPr>
+        <p:txBody>
+          <a:bodyPr anchor="t" rtlCol="false" tIns="0" lIns="0" bIns="0" rIns="0">
+            <a:spAutoFit/>
+          </a:bodyPr>
+          <a:lstStyle/>
+          <a:p>
+            <a:pPr algn="ctr">
+              <a:lnSpc>
+                <a:spcPts val="2949"/>
+              </a:lnSpc>
+            </a:pPr>
+            <a:r>
+              <a:rPr lang="en-US" sz="2499">
+                <a:solidFill>
+                  <a:srgbClr val="3C3C3C"/>
+                </a:solidFill>
+                <a:latin typeface="Montserrat Classic Bold Italics"/>
+              </a:rPr>
+              <a:t>Average Accuracy : 0.8245 </a:t>
+            </a:r>
+          </a:p>
+        </p:txBody>
+      </p:sp>
+      <p:sp>
+        <p:nvSpPr>
+          <p:cNvPr name="TextBox 14" id="14"/>
+          <p:cNvSpPr txBox="true"/>
+          <p:nvPr/>
+        </p:nvSpPr>
+        <p:spPr>
+          <a:xfrm rot="0">
+            <a:off x="10567813" y="3550202"/>
+            <a:ext cx="5088915" cy="697425"/>
+          </a:xfrm>
+          <a:prstGeom prst="rect">
+            <a:avLst/>
+          </a:prstGeom>
+        </p:spPr>
+        <p:txBody>
+          <a:bodyPr anchor="t" rtlCol="false" tIns="0" lIns="0" bIns="0" rIns="0">
+            <a:spAutoFit/>
+          </a:bodyPr>
+          <a:lstStyle/>
+          <a:p>
+            <a:pPr algn="ctr">
+              <a:lnSpc>
+                <a:spcPts val="5400"/>
+              </a:lnSpc>
+            </a:pPr>
+            <a:r>
+              <a:rPr lang="en-US" sz="4576">
+                <a:solidFill>
+                  <a:srgbClr val="CA5E28"/>
+                </a:solidFill>
+                <a:latin typeface="Montserrat Classic Bold"/>
+              </a:rPr>
+              <a:t>LSTM</a:t>
+            </a:r>
+          </a:p>
+        </p:txBody>
+      </p:sp>
+      <p:sp>
+        <p:nvSpPr>
+          <p:cNvPr name="TextBox 15" id="15"/>
+          <p:cNvSpPr txBox="true"/>
+          <p:nvPr/>
+        </p:nvSpPr>
+        <p:spPr>
+          <a:xfrm rot="0">
+            <a:off x="11067131" y="4444815"/>
+            <a:ext cx="4090278" cy="377825"/>
+          </a:xfrm>
+          <a:prstGeom prst="rect">
+            <a:avLst/>
+          </a:prstGeom>
+        </p:spPr>
+        <p:txBody>
+          <a:bodyPr anchor="t" rtlCol="false" tIns="0" lIns="0" bIns="0" rIns="0">
+            <a:spAutoFit/>
+          </a:bodyPr>
+          <a:lstStyle/>
+          <a:p>
+            <a:pPr algn="ctr">
+              <a:lnSpc>
+                <a:spcPts val="2949"/>
+              </a:lnSpc>
+            </a:pPr>
+            <a:r>
+              <a:rPr lang="en-US" sz="2499">
+                <a:solidFill>
+                  <a:srgbClr val="3C3C3C"/>
+                </a:solidFill>
+                <a:latin typeface="Montserrat Classic Bold Italics"/>
+              </a:rPr>
+              <a:t>Average Accuracy :  0.91</a:t>
+            </a:r>
+          </a:p>
+        </p:txBody>
+      </p:sp>
+    </p:spTree>
+  </p:cSld>
+  <p:clrMapOvr>
+    <a:masterClrMapping/>
+  </p:clrMapOvr>
+</p:sld>
+</file>
+
+<file path=ppt/slides/slide11.xml><?xml version="1.0" encoding="utf-8"?>
+<p:sld xmlns:p="http://schemas.openxmlformats.org/presentationml/2006/main" xmlns:a="http://schemas.openxmlformats.org/drawingml/2006/main" xmlns:r="http://schemas.openxmlformats.org/officeDocument/2006/relationships">
+  <p:cSld>
+    <p:bg>
+      <p:bgPr>
+        <a:solidFill>
+          <a:srgbClr val="F8F3F0"/>
+        </a:solidFill>
+      </p:bgPr>
+    </p:bg>
+    <p:spTree>
+      <p:nvGrpSpPr>
+        <p:cNvPr id="1" name=""/>
+        <p:cNvGrpSpPr/>
+        <p:nvPr/>
+      </p:nvGrpSpPr>
+      <p:grpSpPr>
+        <a:xfrm>
+          <a:off x="0" y="0"/>
+          <a:ext cx="0" cy="0"/>
+          <a:chOff x="0" y="0"/>
+          <a:chExt cx="0" cy="0"/>
+        </a:xfrm>
+      </p:grpSpPr>
+      <p:sp>
+        <p:nvSpPr>
+          <p:cNvPr name="Freeform 2" id="2"/>
+          <p:cNvSpPr/>
+          <p:nvPr/>
+        </p:nvSpPr>
+        <p:spPr>
           <a:xfrm flipH="false" flipV="false" rot="-1820470">
             <a:off x="8879014" y="-3736834"/>
             <a:ext cx="19211116" cy="20394798"/>
@@ -4343,7 +4999,7 @@
 </p:sld>
 </file>
 
-<file path=ppt/slides/slide11.xml><?xml version="1.0" encoding="utf-8"?>
+<file path=ppt/slides/slide12.xml><?xml version="1.0" encoding="utf-8"?>
 <p:sld xmlns:p="http://schemas.openxmlformats.org/presentationml/2006/main" xmlns:a="http://schemas.openxmlformats.org/drawingml/2006/main" xmlns:r="http://schemas.openxmlformats.org/officeDocument/2006/relationships">
   <p:cSld>
     <p:bg>
@@ -4972,7 +5628,7 @@
 </p:sld>
 </file>
 
-<file path=ppt/slides/slide12.xml><?xml version="1.0" encoding="utf-8"?>
+<file path=ppt/slides/slide13.xml><?xml version="1.0" encoding="utf-8"?>
 <p:sld xmlns:p="http://schemas.openxmlformats.org/presentationml/2006/main" xmlns:a="http://schemas.openxmlformats.org/drawingml/2006/main" xmlns:r="http://schemas.openxmlformats.org/officeDocument/2006/relationships">
   <p:cSld>
     <p:bg>
@@ -5431,7 +6087,7 @@
 </p:sld>
 </file>
 
-<file path=ppt/slides/slide13.xml><?xml version="1.0" encoding="utf-8"?>
+<file path=ppt/slides/slide14.xml><?xml version="1.0" encoding="utf-8"?>
 <p:sld xmlns:p="http://schemas.openxmlformats.org/presentationml/2006/main" xmlns:a="http://schemas.openxmlformats.org/drawingml/2006/main" xmlns:r="http://schemas.openxmlformats.org/officeDocument/2006/relationships">
   <p:cSld>
     <p:bg>
@@ -5810,7 +6466,7 @@
                 </a:solidFill>
                 <a:latin typeface="Aileron"/>
               </a:rPr>
-              <a:t>Model LSTM memiliki akurasi paling tinggi sekitar 0.91 %, sedangkan model MLP memilki akurasi sekitar 0.82 %</a:t>
+              <a:t>Model LSTM memiliki akurasi paling tinggi sekitar 91 %, sedangkan model MLP memilki akurasi sekitar 82 %</a:t>
             </a:r>
           </a:p>
           <a:p>
@@ -8013,7 +8669,7 @@
         </p:nvSpPr>
         <p:spPr>
           <a:xfrm rot="0">
-            <a:off x="983942" y="4280480"/>
+            <a:off x="1028700" y="5467205"/>
             <a:ext cx="7445536" cy="1233836"/>
           </a:xfrm>
           <a:prstGeom prst="rect">
@@ -8055,6 +8711,44 @@
                 <a:latin typeface="Aileron"/>
               </a:rPr>
               <a:t>Median Text Length :  28.0 </a:t>
+            </a:r>
+          </a:p>
+        </p:txBody>
+      </p:sp>
+      <p:sp>
+        <p:nvSpPr>
+          <p:cNvPr name="TextBox 9" id="9"/>
+          <p:cNvSpPr txBox="true"/>
+          <p:nvPr/>
+        </p:nvSpPr>
+        <p:spPr>
+          <a:xfrm rot="0">
+            <a:off x="1028700" y="3518994"/>
+            <a:ext cx="7445536" cy="1862486"/>
+          </a:xfrm>
+          <a:prstGeom prst="rect">
+            <a:avLst/>
+          </a:prstGeom>
+        </p:spPr>
+        <p:txBody>
+          <a:bodyPr anchor="t" rtlCol="false" tIns="0" lIns="0" bIns="0" rIns="0">
+            <a:spAutoFit/>
+          </a:bodyPr>
+          <a:lstStyle/>
+          <a:p>
+            <a:pPr>
+              <a:lnSpc>
+                <a:spcPts val="4968"/>
+              </a:lnSpc>
+            </a:pPr>
+            <a:r>
+              <a:rPr lang="en-US" sz="3548">
+                <a:solidFill>
+                  <a:srgbClr val="3C3C3C"/>
+                </a:solidFill>
+                <a:latin typeface="Aileron"/>
+              </a:rPr>
+              <a:t>Dataset memiliki 11000 rows, dengan label (Negative, Neutral, dan Positive) </a:t>
             </a:r>
           </a:p>
         </p:txBody>
@@ -8372,8 +9066,8 @@
         </p:nvSpPr>
         <p:spPr>
           <a:xfrm rot="0">
-            <a:off x="1339344" y="4182087"/>
-            <a:ext cx="7445536" cy="3748436"/>
+            <a:off x="1677440" y="4182087"/>
+            <a:ext cx="7107440" cy="3748436"/>
           </a:xfrm>
           <a:prstGeom prst="rect">
             <a:avLst/>
@@ -9572,7 +10266,7 @@
 </file>
 
 <file path=ppt/slides/slide9.xml><?xml version="1.0" encoding="utf-8"?>
-<p:sld xmlns:p="http://schemas.openxmlformats.org/presentationml/2006/main" xmlns:a="http://schemas.openxmlformats.org/drawingml/2006/main" xmlns:r="http://schemas.openxmlformats.org/officeDocument/2006/relationships">
+<p:sld xmlns:p="http://schemas.openxmlformats.org/presentationml/2006/main" xmlns:a="http://schemas.openxmlformats.org/drawingml/2006/main">
   <p:cSld>
     <p:bg>
       <p:bgPr>
@@ -9595,417 +10289,1754 @@
           <a:chExt cx="0" cy="0"/>
         </a:xfrm>
       </p:grpSpPr>
-      <p:sp>
-        <p:nvSpPr>
-          <p:cNvPr name="Freeform 2" id="2"/>
-          <p:cNvSpPr/>
+      <p:graphicFrame>
+        <p:nvGraphicFramePr>
+          <p:cNvPr name="Table 2" id="2"/>
+          <p:cNvGraphicFramePr>
+            <a:graphicFrameLocks noGrp="true"/>
+          </p:cNvGraphicFramePr>
           <p:nvPr/>
-        </p:nvSpPr>
-        <p:spPr>
-          <a:xfrm flipH="false" flipV="false" rot="1295726">
-            <a:off x="-5282231" y="-7243759"/>
-            <a:ext cx="16615040" cy="20806262"/>
-          </a:xfrm>
-          <a:custGeom>
-            <a:avLst/>
-            <a:gdLst/>
-            <a:ahLst/>
-            <a:cxnLst/>
-            <a:rect r="r" b="b" t="t" l="l"/>
-            <a:pathLst>
-              <a:path h="20806262" w="16615040">
-                <a:moveTo>
-                  <a:pt x="0" y="0"/>
-                </a:moveTo>
-                <a:lnTo>
-                  <a:pt x="16615040" y="0"/>
-                </a:lnTo>
-                <a:lnTo>
-                  <a:pt x="16615040" y="20806262"/>
-                </a:lnTo>
-                <a:lnTo>
-                  <a:pt x="0" y="20806262"/>
-                </a:lnTo>
-                <a:lnTo>
-                  <a:pt x="0" y="0"/>
-                </a:lnTo>
-                <a:close/>
-              </a:path>
-            </a:pathLst>
-          </a:custGeom>
-          <a:blipFill>
-            <a:blip r:embed="rId2">
-              <a:alphaModFix amt="9999"/>
-              <a:extLst>
-                <a:ext uri="{96DAC541-7B7A-43D3-8B79-37D633B846F1}">
-                  <asvg:svgBlip xmlns:asvg="http://schemas.microsoft.com/office/drawing/2016/SVG/main" r:embed="rId3"/>
-                </a:ext>
-              </a:extLst>
-            </a:blip>
-            <a:stretch>
-              <a:fillRect l="0" t="-2551" r="-21036" b="0"/>
-            </a:stretch>
-          </a:blipFill>
-        </p:spPr>
-      </p:sp>
-      <p:sp>
-        <p:nvSpPr>
-          <p:cNvPr name="AutoShape 3" id="3"/>
-          <p:cNvSpPr/>
-          <p:nvPr/>
-        </p:nvSpPr>
-        <p:spPr>
-          <a:xfrm>
-            <a:off x="2896207" y="4252390"/>
-            <a:ext cx="4559046" cy="0"/>
-          </a:xfrm>
-          <a:prstGeom prst="line">
-            <a:avLst/>
-          </a:prstGeom>
-          <a:ln cap="flat" w="9525">
-            <a:solidFill>
-              <a:srgbClr val="000000"/>
-            </a:solidFill>
-            <a:prstDash val="solid"/>
-            <a:headEnd type="none" len="sm" w="sm"/>
-            <a:tailEnd type="none" len="sm" w="sm"/>
-          </a:ln>
-        </p:spPr>
-      </p:sp>
-      <p:sp>
-        <p:nvSpPr>
-          <p:cNvPr name="AutoShape 4" id="4"/>
-          <p:cNvSpPr/>
-          <p:nvPr/>
-        </p:nvSpPr>
-        <p:spPr>
-          <a:xfrm>
-            <a:off x="10832747" y="4257152"/>
-            <a:ext cx="4559046" cy="0"/>
-          </a:xfrm>
-          <a:prstGeom prst="line">
-            <a:avLst/>
-          </a:prstGeom>
-          <a:ln cap="flat" w="9525">
-            <a:solidFill>
-              <a:srgbClr val="000000"/>
-            </a:solidFill>
-            <a:prstDash val="solid"/>
-            <a:headEnd type="none" len="sm" w="sm"/>
-            <a:tailEnd type="none" len="sm" w="sm"/>
-          </a:ln>
-        </p:spPr>
-      </p:sp>
-      <p:sp>
-        <p:nvSpPr>
-          <p:cNvPr name="Freeform 5" id="5"/>
-          <p:cNvSpPr/>
-          <p:nvPr/>
-        </p:nvSpPr>
-        <p:spPr>
-          <a:xfrm flipH="false" flipV="false" rot="0">
-            <a:off x="576481" y="482886"/>
-            <a:ext cx="2319725" cy="2100406"/>
-          </a:xfrm>
-          <a:custGeom>
-            <a:avLst/>
-            <a:gdLst/>
-            <a:ahLst/>
-            <a:cxnLst/>
-            <a:rect r="r" b="b" t="t" l="l"/>
-            <a:pathLst>
-              <a:path h="2100406" w="2319725">
-                <a:moveTo>
-                  <a:pt x="0" y="0"/>
-                </a:moveTo>
-                <a:lnTo>
-                  <a:pt x="2319726" y="0"/>
-                </a:lnTo>
-                <a:lnTo>
-                  <a:pt x="2319726" y="2100406"/>
-                </a:lnTo>
-                <a:lnTo>
-                  <a:pt x="0" y="2100406"/>
-                </a:lnTo>
-                <a:lnTo>
-                  <a:pt x="0" y="0"/>
-                </a:lnTo>
-                <a:close/>
-              </a:path>
-            </a:pathLst>
-          </a:custGeom>
-          <a:blipFill>
-            <a:blip r:embed="rId4">
-              <a:extLst>
-                <a:ext uri="{96DAC541-7B7A-43D3-8B79-37D633B846F1}">
-                  <asvg:svgBlip xmlns:asvg="http://schemas.microsoft.com/office/drawing/2016/SVG/main" r:embed="rId5"/>
-                </a:ext>
-              </a:extLst>
-            </a:blip>
-            <a:stretch>
-              <a:fillRect l="0" t="0" r="0" b="0"/>
-            </a:stretch>
-          </a:blipFill>
-        </p:spPr>
-      </p:sp>
-      <p:sp>
-        <p:nvSpPr>
-          <p:cNvPr name="Freeform 6" id="6"/>
-          <p:cNvSpPr/>
-          <p:nvPr/>
-        </p:nvSpPr>
-        <p:spPr>
-          <a:xfrm flipH="false" flipV="false" rot="0">
-            <a:off x="16227715" y="2117965"/>
-            <a:ext cx="2880184" cy="2864474"/>
-          </a:xfrm>
-          <a:custGeom>
-            <a:avLst/>
-            <a:gdLst/>
-            <a:ahLst/>
-            <a:cxnLst/>
-            <a:rect r="r" b="b" t="t" l="l"/>
-            <a:pathLst>
-              <a:path h="2864474" w="2880184">
-                <a:moveTo>
-                  <a:pt x="0" y="0"/>
-                </a:moveTo>
-                <a:lnTo>
-                  <a:pt x="2880184" y="0"/>
-                </a:lnTo>
-                <a:lnTo>
-                  <a:pt x="2880184" y="2864474"/>
-                </a:lnTo>
-                <a:lnTo>
-                  <a:pt x="0" y="2864474"/>
-                </a:lnTo>
-                <a:lnTo>
-                  <a:pt x="0" y="0"/>
-                </a:lnTo>
-                <a:close/>
-              </a:path>
-            </a:pathLst>
-          </a:custGeom>
-          <a:blipFill>
-            <a:blip r:embed="rId6">
-              <a:extLst>
-                <a:ext uri="{96DAC541-7B7A-43D3-8B79-37D633B846F1}">
-                  <asvg:svgBlip xmlns:asvg="http://schemas.microsoft.com/office/drawing/2016/SVG/main" r:embed="rId7"/>
-                </a:ext>
-              </a:extLst>
-            </a:blip>
-            <a:stretch>
-              <a:fillRect l="0" t="0" r="0" b="0"/>
-            </a:stretch>
-          </a:blipFill>
-        </p:spPr>
-      </p:sp>
-      <p:sp>
-        <p:nvSpPr>
-          <p:cNvPr name="Freeform 7" id="7"/>
-          <p:cNvSpPr/>
-          <p:nvPr/>
-        </p:nvSpPr>
-        <p:spPr>
-          <a:xfrm flipH="true" flipV="false" rot="0">
-            <a:off x="-908077" y="7106246"/>
-            <a:ext cx="4110337" cy="4114800"/>
-          </a:xfrm>
-          <a:custGeom>
-            <a:avLst/>
-            <a:gdLst/>
-            <a:ahLst/>
-            <a:cxnLst/>
-            <a:rect r="r" b="b" t="t" l="l"/>
-            <a:pathLst>
-              <a:path h="4114800" w="4110337">
-                <a:moveTo>
-                  <a:pt x="4110337" y="0"/>
-                </a:moveTo>
-                <a:lnTo>
-                  <a:pt x="0" y="0"/>
-                </a:lnTo>
-                <a:lnTo>
-                  <a:pt x="0" y="4114800"/>
-                </a:lnTo>
-                <a:lnTo>
-                  <a:pt x="4110337" y="4114800"/>
-                </a:lnTo>
-                <a:lnTo>
-                  <a:pt x="4110337" y="0"/>
-                </a:lnTo>
-                <a:close/>
-              </a:path>
-            </a:pathLst>
-          </a:custGeom>
-          <a:blipFill>
-            <a:blip r:embed="rId8">
-              <a:extLst>
-                <a:ext uri="{96DAC541-7B7A-43D3-8B79-37D633B846F1}">
-                  <asvg:svgBlip xmlns:asvg="http://schemas.microsoft.com/office/drawing/2016/SVG/main" r:embed="rId9"/>
-                </a:ext>
-              </a:extLst>
-            </a:blip>
-            <a:stretch>
-              <a:fillRect l="0" t="0" r="0" b="0"/>
-            </a:stretch>
-          </a:blipFill>
-        </p:spPr>
-      </p:sp>
-      <p:sp>
-        <p:nvSpPr>
-          <p:cNvPr name="Freeform 8" id="8"/>
-          <p:cNvSpPr/>
-          <p:nvPr/>
-        </p:nvSpPr>
-        <p:spPr>
-          <a:xfrm flipH="false" flipV="false" rot="0">
-            <a:off x="15391793" y="8747991"/>
-            <a:ext cx="2043047" cy="1020617"/>
-          </a:xfrm>
-          <a:custGeom>
-            <a:avLst/>
-            <a:gdLst/>
-            <a:ahLst/>
-            <a:cxnLst/>
-            <a:rect r="r" b="b" t="t" l="l"/>
-            <a:pathLst>
-              <a:path h="1020617" w="2043047">
-                <a:moveTo>
-                  <a:pt x="0" y="0"/>
-                </a:moveTo>
-                <a:lnTo>
-                  <a:pt x="2043048" y="0"/>
-                </a:lnTo>
-                <a:lnTo>
-                  <a:pt x="2043048" y="1020618"/>
-                </a:lnTo>
-                <a:lnTo>
-                  <a:pt x="0" y="1020618"/>
-                </a:lnTo>
-                <a:lnTo>
-                  <a:pt x="0" y="0"/>
-                </a:lnTo>
-                <a:close/>
-              </a:path>
-            </a:pathLst>
-          </a:custGeom>
-          <a:blipFill>
-            <a:blip r:embed="rId10">
-              <a:extLst>
-                <a:ext uri="{96DAC541-7B7A-43D3-8B79-37D633B846F1}">
-                  <asvg:svgBlip xmlns:asvg="http://schemas.microsoft.com/office/drawing/2016/SVG/main" r:embed="rId11"/>
-                </a:ext>
-              </a:extLst>
-            </a:blip>
-            <a:stretch>
-              <a:fillRect l="0" t="0" r="0" b="0"/>
-            </a:stretch>
-          </a:blipFill>
-        </p:spPr>
-      </p:sp>
-      <p:sp>
-        <p:nvSpPr>
-          <p:cNvPr name="Freeform 9" id="9"/>
-          <p:cNvSpPr/>
-          <p:nvPr/>
-        </p:nvSpPr>
-        <p:spPr>
-          <a:xfrm flipH="false" flipV="false" rot="0">
-            <a:off x="2461910" y="5143500"/>
-            <a:ext cx="5427639" cy="4756033"/>
-          </a:xfrm>
-          <a:custGeom>
-            <a:avLst/>
-            <a:gdLst/>
-            <a:ahLst/>
-            <a:cxnLst/>
-            <a:rect r="r" b="b" t="t" l="l"/>
-            <a:pathLst>
-              <a:path h="4756033" w="5427639">
-                <a:moveTo>
-                  <a:pt x="0" y="0"/>
-                </a:moveTo>
-                <a:lnTo>
-                  <a:pt x="5427639" y="0"/>
-                </a:lnTo>
-                <a:lnTo>
-                  <a:pt x="5427639" y="4756033"/>
-                </a:lnTo>
-                <a:lnTo>
-                  <a:pt x="0" y="4756033"/>
-                </a:lnTo>
-                <a:lnTo>
-                  <a:pt x="0" y="0"/>
-                </a:lnTo>
-                <a:close/>
-              </a:path>
-            </a:pathLst>
-          </a:custGeom>
-          <a:blipFill>
-            <a:blip r:embed="rId12"/>
-            <a:stretch>
-              <a:fillRect l="0" t="-2332" r="0" b="-2332"/>
-            </a:stretch>
-          </a:blipFill>
-        </p:spPr>
-      </p:sp>
-      <p:sp>
-        <p:nvSpPr>
-          <p:cNvPr name="Freeform 10" id="10"/>
-          <p:cNvSpPr/>
-          <p:nvPr/>
-        </p:nvSpPr>
-        <p:spPr>
-          <a:xfrm flipH="false" flipV="false" rot="0">
-            <a:off x="10330002" y="5143500"/>
-            <a:ext cx="5564537" cy="4961584"/>
-          </a:xfrm>
-          <a:custGeom>
-            <a:avLst/>
-            <a:gdLst/>
-            <a:ahLst/>
-            <a:cxnLst/>
-            <a:rect r="r" b="b" t="t" l="l"/>
-            <a:pathLst>
-              <a:path h="4961584" w="5564537">
-                <a:moveTo>
-                  <a:pt x="0" y="0"/>
-                </a:moveTo>
-                <a:lnTo>
-                  <a:pt x="5564537" y="0"/>
-                </a:lnTo>
-                <a:lnTo>
-                  <a:pt x="5564537" y="4961584"/>
-                </a:lnTo>
-                <a:lnTo>
-                  <a:pt x="0" y="4961584"/>
-                </a:lnTo>
-                <a:lnTo>
-                  <a:pt x="0" y="0"/>
-                </a:lnTo>
-                <a:close/>
-              </a:path>
-            </a:pathLst>
-          </a:custGeom>
-          <a:blipFill>
-            <a:blip r:embed="rId13"/>
-            <a:stretch>
-              <a:fillRect l="-1612" t="-156" r="-1153" b="0"/>
-            </a:stretch>
-          </a:blipFill>
-        </p:spPr>
-      </p:sp>
-      <p:sp>
-        <p:nvSpPr>
-          <p:cNvPr name="TextBox 11" id="11"/>
+        </p:nvGraphicFramePr>
+        <p:xfrm>
+          <a:off x="5097211" y="678677"/>
+          <a:ext cx="12162089" cy="4464823"/>
+        </p:xfrm>
+        <a:graphic>
+          <a:graphicData uri="http://schemas.openxmlformats.org/drawingml/2006/table">
+            <a:tbl>
+              <a:tblPr/>
+              <a:tblGrid>
+                <a:gridCol w="1351343"/>
+                <a:gridCol w="1351343"/>
+                <a:gridCol w="1351343"/>
+                <a:gridCol w="1351343"/>
+                <a:gridCol w="1351343"/>
+                <a:gridCol w="1351343"/>
+                <a:gridCol w="1351343"/>
+                <a:gridCol w="1351343"/>
+                <a:gridCol w="1351343"/>
+              </a:tblGrid>
+              <a:tr h="1353849">
+                <a:tc gridSpan="9">
+                  <a:txBody>
+                    <a:bodyPr anchor="t" rtlCol="false"/>
+                    <a:lstStyle/>
+                    <a:p>
+                      <a:pPr algn="ctr">
+                        <a:lnSpc>
+                          <a:spcPts val="6424"/>
+                        </a:lnSpc>
+                        <a:defRPr/>
+                      </a:pPr>
+                      <a:r>
+                        <a:rPr lang="en-US" sz="4589">
+                          <a:solidFill>
+                            <a:srgbClr val="3C3C3C"/>
+                          </a:solidFill>
+                          <a:latin typeface="Aileron Heavy"/>
+                        </a:rPr>
+                        <a:t>Parameter</a:t>
+                      </a:r>
+                      <a:endParaRPr lang="en-US" sz="1100"/>
+                    </a:p>
+                  </a:txBody>
+                  <a:tcPr marL="178488" marR="178488" marT="178488" marB="178488" anchor="ctr">
+                    <a:lnL cmpd="sng" algn="ctr" cap="flat" w="35698">
+                      <a:solidFill>
+                        <a:srgbClr val="000000"/>
+                      </a:solidFill>
+                      <a:prstDash val="solid"/>
+                      <a:round/>
+                      <a:headEnd type="none" w="med" len="med"/>
+                      <a:tailEnd type="none" w="med" len="med"/>
+                    </a:lnL>
+                    <a:lnR cmpd="sng" algn="ctr" cap="flat" w="35698">
+                      <a:solidFill>
+                        <a:srgbClr val="000000"/>
+                      </a:solidFill>
+                      <a:prstDash val="solid"/>
+                      <a:round/>
+                      <a:headEnd type="none" w="med" len="med"/>
+                      <a:tailEnd type="none" w="med" len="med"/>
+                    </a:lnR>
+                    <a:lnT cmpd="sng" algn="ctr" cap="flat" w="35698">
+                      <a:solidFill>
+                        <a:srgbClr val="000000"/>
+                      </a:solidFill>
+                      <a:prstDash val="solid"/>
+                      <a:round/>
+                      <a:headEnd type="none" w="med" len="med"/>
+                      <a:tailEnd type="none" w="med" len="med"/>
+                    </a:lnT>
+                    <a:lnB cmpd="sng" algn="ctr" cap="flat" w="35698">
+                      <a:solidFill>
+                        <a:srgbClr val="000000"/>
+                      </a:solidFill>
+                      <a:prstDash val="solid"/>
+                      <a:round/>
+                      <a:headEnd type="none" w="med" len="med"/>
+                      <a:tailEnd type="none" w="med" len="med"/>
+                    </a:lnB>
+                    <a:solidFill>
+                      <a:srgbClr val="C1B6AA"/>
+                    </a:solidFill>
+                  </a:tcPr>
+                </a:tc>
+                <a:tc hMerge="true">
+                  <a:txBody>
+                    <a:bodyPr anchor="t" rtlCol="false"/>
+                    <a:lstStyle/>
+                    <a:p>
+                      <a:pPr algn="ctr">
+                        <a:lnSpc>
+                          <a:spcPts val="6424"/>
+                        </a:lnSpc>
+                        <a:defRPr/>
+                      </a:pPr>
+                      <a:r>
+                        <a:rPr lang="en-US" sz="4589">
+                          <a:solidFill>
+                            <a:srgbClr val="3C3C3C"/>
+                          </a:solidFill>
+                          <a:latin typeface="Aileron Heavy"/>
+                        </a:rPr>
+                        <a:t>Parameter</a:t>
+                      </a:r>
+                      <a:endParaRPr lang="en-US" sz="1100"/>
+                    </a:p>
+                  </a:txBody>
+                  <a:tcPr marL="178488" marR="178488" marT="178488" marB="178488" anchor="ctr">
+                    <a:lnL cmpd="sng" algn="ctr" cap="flat" w="35698">
+                      <a:solidFill>
+                        <a:srgbClr val="000000"/>
+                      </a:solidFill>
+                      <a:prstDash val="solid"/>
+                      <a:round/>
+                      <a:headEnd type="none" w="med" len="med"/>
+                      <a:tailEnd type="none" w="med" len="med"/>
+                    </a:lnL>
+                    <a:lnR cmpd="sng" algn="ctr" cap="flat" w="35698">
+                      <a:solidFill>
+                        <a:srgbClr val="000000"/>
+                      </a:solidFill>
+                      <a:prstDash val="solid"/>
+                      <a:round/>
+                      <a:headEnd type="none" w="med" len="med"/>
+                      <a:tailEnd type="none" w="med" len="med"/>
+                    </a:lnR>
+                    <a:lnT cmpd="sng" algn="ctr" cap="flat" w="35698">
+                      <a:solidFill>
+                        <a:srgbClr val="000000"/>
+                      </a:solidFill>
+                      <a:prstDash val="solid"/>
+                      <a:round/>
+                      <a:headEnd type="none" w="med" len="med"/>
+                      <a:tailEnd type="none" w="med" len="med"/>
+                    </a:lnT>
+                    <a:lnB cmpd="sng" algn="ctr" cap="flat" w="35698">
+                      <a:solidFill>
+                        <a:srgbClr val="000000"/>
+                      </a:solidFill>
+                      <a:prstDash val="solid"/>
+                      <a:round/>
+                      <a:headEnd type="none" w="med" len="med"/>
+                      <a:tailEnd type="none" w="med" len="med"/>
+                    </a:lnB>
+                    <a:solidFill>
+                      <a:srgbClr val="C1B6AA"/>
+                    </a:solidFill>
+                  </a:tcPr>
+                </a:tc>
+                <a:tc hMerge="true">
+                  <a:txBody>
+                    <a:bodyPr anchor="t" rtlCol="false"/>
+                    <a:lstStyle/>
+                    <a:p>
+                      <a:pPr algn="ctr">
+                        <a:lnSpc>
+                          <a:spcPts val="6424"/>
+                        </a:lnSpc>
+                        <a:defRPr/>
+                      </a:pPr>
+                      <a:r>
+                        <a:rPr lang="en-US" sz="4589">
+                          <a:solidFill>
+                            <a:srgbClr val="3C3C3C"/>
+                          </a:solidFill>
+                          <a:latin typeface="Aileron Heavy"/>
+                        </a:rPr>
+                        <a:t>Parameter</a:t>
+                      </a:r>
+                      <a:endParaRPr lang="en-US" sz="1100"/>
+                    </a:p>
+                  </a:txBody>
+                  <a:tcPr marL="178488" marR="178488" marT="178488" marB="178488" anchor="ctr">
+                    <a:lnL cmpd="sng" algn="ctr" cap="flat" w="35698">
+                      <a:solidFill>
+                        <a:srgbClr val="000000"/>
+                      </a:solidFill>
+                      <a:prstDash val="solid"/>
+                      <a:round/>
+                      <a:headEnd type="none" w="med" len="med"/>
+                      <a:tailEnd type="none" w="med" len="med"/>
+                    </a:lnL>
+                    <a:lnR cmpd="sng" algn="ctr" cap="flat" w="35698">
+                      <a:solidFill>
+                        <a:srgbClr val="000000"/>
+                      </a:solidFill>
+                      <a:prstDash val="solid"/>
+                      <a:round/>
+                      <a:headEnd type="none" w="med" len="med"/>
+                      <a:tailEnd type="none" w="med" len="med"/>
+                    </a:lnR>
+                    <a:lnT cmpd="sng" algn="ctr" cap="flat" w="35698">
+                      <a:solidFill>
+                        <a:srgbClr val="000000"/>
+                      </a:solidFill>
+                      <a:prstDash val="solid"/>
+                      <a:round/>
+                      <a:headEnd type="none" w="med" len="med"/>
+                      <a:tailEnd type="none" w="med" len="med"/>
+                    </a:lnT>
+                    <a:lnB cmpd="sng" algn="ctr" cap="flat" w="35698">
+                      <a:solidFill>
+                        <a:srgbClr val="000000"/>
+                      </a:solidFill>
+                      <a:prstDash val="solid"/>
+                      <a:round/>
+                      <a:headEnd type="none" w="med" len="med"/>
+                      <a:tailEnd type="none" w="med" len="med"/>
+                    </a:lnB>
+                    <a:solidFill>
+                      <a:srgbClr val="C1B6AA"/>
+                    </a:solidFill>
+                  </a:tcPr>
+                </a:tc>
+                <a:tc hMerge="true">
+                  <a:txBody>
+                    <a:bodyPr anchor="t" rtlCol="false"/>
+                    <a:lstStyle/>
+                    <a:p>
+                      <a:pPr algn="ctr">
+                        <a:lnSpc>
+                          <a:spcPts val="6424"/>
+                        </a:lnSpc>
+                        <a:defRPr/>
+                      </a:pPr>
+                      <a:r>
+                        <a:rPr lang="en-US" sz="4589">
+                          <a:solidFill>
+                            <a:srgbClr val="3C3C3C"/>
+                          </a:solidFill>
+                          <a:latin typeface="Aileron Heavy"/>
+                        </a:rPr>
+                        <a:t>Parameter</a:t>
+                      </a:r>
+                      <a:endParaRPr lang="en-US" sz="1100"/>
+                    </a:p>
+                  </a:txBody>
+                  <a:tcPr marL="178488" marR="178488" marT="178488" marB="178488" anchor="ctr">
+                    <a:lnL cmpd="sng" algn="ctr" cap="flat" w="35698">
+                      <a:solidFill>
+                        <a:srgbClr val="000000"/>
+                      </a:solidFill>
+                      <a:prstDash val="solid"/>
+                      <a:round/>
+                      <a:headEnd type="none" w="med" len="med"/>
+                      <a:tailEnd type="none" w="med" len="med"/>
+                    </a:lnL>
+                    <a:lnR cmpd="sng" algn="ctr" cap="flat" w="35698">
+                      <a:solidFill>
+                        <a:srgbClr val="000000"/>
+                      </a:solidFill>
+                      <a:prstDash val="solid"/>
+                      <a:round/>
+                      <a:headEnd type="none" w="med" len="med"/>
+                      <a:tailEnd type="none" w="med" len="med"/>
+                    </a:lnR>
+                    <a:lnT cmpd="sng" algn="ctr" cap="flat" w="35698">
+                      <a:solidFill>
+                        <a:srgbClr val="000000"/>
+                      </a:solidFill>
+                      <a:prstDash val="solid"/>
+                      <a:round/>
+                      <a:headEnd type="none" w="med" len="med"/>
+                      <a:tailEnd type="none" w="med" len="med"/>
+                    </a:lnT>
+                    <a:lnB cmpd="sng" algn="ctr" cap="flat" w="35698">
+                      <a:solidFill>
+                        <a:srgbClr val="000000"/>
+                      </a:solidFill>
+                      <a:prstDash val="solid"/>
+                      <a:round/>
+                      <a:headEnd type="none" w="med" len="med"/>
+                      <a:tailEnd type="none" w="med" len="med"/>
+                    </a:lnB>
+                    <a:solidFill>
+                      <a:srgbClr val="C1B6AA"/>
+                    </a:solidFill>
+                  </a:tcPr>
+                </a:tc>
+                <a:tc hMerge="true">
+                  <a:txBody>
+                    <a:bodyPr anchor="t" rtlCol="false"/>
+                    <a:lstStyle/>
+                    <a:p>
+                      <a:pPr algn="ctr">
+                        <a:lnSpc>
+                          <a:spcPts val="6424"/>
+                        </a:lnSpc>
+                        <a:defRPr/>
+                      </a:pPr>
+                      <a:r>
+                        <a:rPr lang="en-US" sz="4589">
+                          <a:solidFill>
+                            <a:srgbClr val="3C3C3C"/>
+                          </a:solidFill>
+                          <a:latin typeface="Aileron Heavy"/>
+                        </a:rPr>
+                        <a:t>Parameter</a:t>
+                      </a:r>
+                      <a:endParaRPr lang="en-US" sz="1100"/>
+                    </a:p>
+                  </a:txBody>
+                  <a:tcPr marL="178488" marR="178488" marT="178488" marB="178488" anchor="ctr">
+                    <a:lnL cmpd="sng" algn="ctr" cap="flat" w="35698">
+                      <a:solidFill>
+                        <a:srgbClr val="000000"/>
+                      </a:solidFill>
+                      <a:prstDash val="solid"/>
+                      <a:round/>
+                      <a:headEnd type="none" w="med" len="med"/>
+                      <a:tailEnd type="none" w="med" len="med"/>
+                    </a:lnL>
+                    <a:lnR cmpd="sng" algn="ctr" cap="flat" w="35698">
+                      <a:solidFill>
+                        <a:srgbClr val="000000"/>
+                      </a:solidFill>
+                      <a:prstDash val="solid"/>
+                      <a:round/>
+                      <a:headEnd type="none" w="med" len="med"/>
+                      <a:tailEnd type="none" w="med" len="med"/>
+                    </a:lnR>
+                    <a:lnT cmpd="sng" algn="ctr" cap="flat" w="35698">
+                      <a:solidFill>
+                        <a:srgbClr val="000000"/>
+                      </a:solidFill>
+                      <a:prstDash val="solid"/>
+                      <a:round/>
+                      <a:headEnd type="none" w="med" len="med"/>
+                      <a:tailEnd type="none" w="med" len="med"/>
+                    </a:lnT>
+                    <a:lnB cmpd="sng" algn="ctr" cap="flat" w="35698">
+                      <a:solidFill>
+                        <a:srgbClr val="000000"/>
+                      </a:solidFill>
+                      <a:prstDash val="solid"/>
+                      <a:round/>
+                      <a:headEnd type="none" w="med" len="med"/>
+                      <a:tailEnd type="none" w="med" len="med"/>
+                    </a:lnB>
+                    <a:solidFill>
+                      <a:srgbClr val="C1B6AA"/>
+                    </a:solidFill>
+                  </a:tcPr>
+                </a:tc>
+                <a:tc hMerge="true">
+                  <a:txBody>
+                    <a:bodyPr anchor="t" rtlCol="false"/>
+                    <a:lstStyle/>
+                    <a:p>
+                      <a:pPr algn="ctr">
+                        <a:lnSpc>
+                          <a:spcPts val="6424"/>
+                        </a:lnSpc>
+                        <a:defRPr/>
+                      </a:pPr>
+                      <a:r>
+                        <a:rPr lang="en-US" sz="4589">
+                          <a:solidFill>
+                            <a:srgbClr val="3C3C3C"/>
+                          </a:solidFill>
+                          <a:latin typeface="Aileron Heavy"/>
+                        </a:rPr>
+                        <a:t>Parameter</a:t>
+                      </a:r>
+                      <a:endParaRPr lang="en-US" sz="1100"/>
+                    </a:p>
+                  </a:txBody>
+                  <a:tcPr marL="178488" marR="178488" marT="178488" marB="178488" anchor="ctr">
+                    <a:lnL cmpd="sng" algn="ctr" cap="flat" w="35698">
+                      <a:solidFill>
+                        <a:srgbClr val="000000"/>
+                      </a:solidFill>
+                      <a:prstDash val="solid"/>
+                      <a:round/>
+                      <a:headEnd type="none" w="med" len="med"/>
+                      <a:tailEnd type="none" w="med" len="med"/>
+                    </a:lnL>
+                    <a:lnR cmpd="sng" algn="ctr" cap="flat" w="35698">
+                      <a:solidFill>
+                        <a:srgbClr val="000000"/>
+                      </a:solidFill>
+                      <a:prstDash val="solid"/>
+                      <a:round/>
+                      <a:headEnd type="none" w="med" len="med"/>
+                      <a:tailEnd type="none" w="med" len="med"/>
+                    </a:lnR>
+                    <a:lnT cmpd="sng" algn="ctr" cap="flat" w="35698">
+                      <a:solidFill>
+                        <a:srgbClr val="000000"/>
+                      </a:solidFill>
+                      <a:prstDash val="solid"/>
+                      <a:round/>
+                      <a:headEnd type="none" w="med" len="med"/>
+                      <a:tailEnd type="none" w="med" len="med"/>
+                    </a:lnT>
+                    <a:lnB cmpd="sng" algn="ctr" cap="flat" w="35698">
+                      <a:solidFill>
+                        <a:srgbClr val="000000"/>
+                      </a:solidFill>
+                      <a:prstDash val="solid"/>
+                      <a:round/>
+                      <a:headEnd type="none" w="med" len="med"/>
+                      <a:tailEnd type="none" w="med" len="med"/>
+                    </a:lnB>
+                    <a:solidFill>
+                      <a:srgbClr val="C1B6AA"/>
+                    </a:solidFill>
+                  </a:tcPr>
+                </a:tc>
+                <a:tc hMerge="true">
+                  <a:txBody>
+                    <a:bodyPr anchor="t" rtlCol="false"/>
+                    <a:lstStyle/>
+                    <a:p>
+                      <a:pPr algn="ctr">
+                        <a:lnSpc>
+                          <a:spcPts val="6424"/>
+                        </a:lnSpc>
+                        <a:defRPr/>
+                      </a:pPr>
+                      <a:r>
+                        <a:rPr lang="en-US" sz="4589">
+                          <a:solidFill>
+                            <a:srgbClr val="3C3C3C"/>
+                          </a:solidFill>
+                          <a:latin typeface="Aileron Heavy"/>
+                        </a:rPr>
+                        <a:t>Parameter</a:t>
+                      </a:r>
+                      <a:endParaRPr lang="en-US" sz="1100"/>
+                    </a:p>
+                  </a:txBody>
+                  <a:tcPr marL="178488" marR="178488" marT="178488" marB="178488" anchor="ctr">
+                    <a:lnL cmpd="sng" algn="ctr" cap="flat" w="35698">
+                      <a:solidFill>
+                        <a:srgbClr val="000000"/>
+                      </a:solidFill>
+                      <a:prstDash val="solid"/>
+                      <a:round/>
+                      <a:headEnd type="none" w="med" len="med"/>
+                      <a:tailEnd type="none" w="med" len="med"/>
+                    </a:lnL>
+                    <a:lnR cmpd="sng" algn="ctr" cap="flat" w="35698">
+                      <a:solidFill>
+                        <a:srgbClr val="000000"/>
+                      </a:solidFill>
+                      <a:prstDash val="solid"/>
+                      <a:round/>
+                      <a:headEnd type="none" w="med" len="med"/>
+                      <a:tailEnd type="none" w="med" len="med"/>
+                    </a:lnR>
+                    <a:lnT cmpd="sng" algn="ctr" cap="flat" w="35698">
+                      <a:solidFill>
+                        <a:srgbClr val="000000"/>
+                      </a:solidFill>
+                      <a:prstDash val="solid"/>
+                      <a:round/>
+                      <a:headEnd type="none" w="med" len="med"/>
+                      <a:tailEnd type="none" w="med" len="med"/>
+                    </a:lnT>
+                    <a:lnB cmpd="sng" algn="ctr" cap="flat" w="35698">
+                      <a:solidFill>
+                        <a:srgbClr val="000000"/>
+                      </a:solidFill>
+                      <a:prstDash val="solid"/>
+                      <a:round/>
+                      <a:headEnd type="none" w="med" len="med"/>
+                      <a:tailEnd type="none" w="med" len="med"/>
+                    </a:lnB>
+                    <a:solidFill>
+                      <a:srgbClr val="C1B6AA"/>
+                    </a:solidFill>
+                  </a:tcPr>
+                </a:tc>
+                <a:tc hMerge="true">
+                  <a:txBody>
+                    <a:bodyPr anchor="t" rtlCol="false"/>
+                    <a:lstStyle/>
+                    <a:p>
+                      <a:pPr algn="ctr">
+                        <a:lnSpc>
+                          <a:spcPts val="6424"/>
+                        </a:lnSpc>
+                        <a:defRPr/>
+                      </a:pPr>
+                      <a:r>
+                        <a:rPr lang="en-US" sz="4589">
+                          <a:solidFill>
+                            <a:srgbClr val="3C3C3C"/>
+                          </a:solidFill>
+                          <a:latin typeface="Aileron Heavy"/>
+                        </a:rPr>
+                        <a:t>Parameter</a:t>
+                      </a:r>
+                      <a:endParaRPr lang="en-US" sz="1100"/>
+                    </a:p>
+                  </a:txBody>
+                  <a:tcPr marL="178488" marR="178488" marT="178488" marB="178488" anchor="ctr">
+                    <a:lnL cmpd="sng" algn="ctr" cap="flat" w="35698">
+                      <a:solidFill>
+                        <a:srgbClr val="000000"/>
+                      </a:solidFill>
+                      <a:prstDash val="solid"/>
+                      <a:round/>
+                      <a:headEnd type="none" w="med" len="med"/>
+                      <a:tailEnd type="none" w="med" len="med"/>
+                    </a:lnL>
+                    <a:lnR cmpd="sng" algn="ctr" cap="flat" w="35698">
+                      <a:solidFill>
+                        <a:srgbClr val="000000"/>
+                      </a:solidFill>
+                      <a:prstDash val="solid"/>
+                      <a:round/>
+                      <a:headEnd type="none" w="med" len="med"/>
+                      <a:tailEnd type="none" w="med" len="med"/>
+                    </a:lnR>
+                    <a:lnT cmpd="sng" algn="ctr" cap="flat" w="35698">
+                      <a:solidFill>
+                        <a:srgbClr val="000000"/>
+                      </a:solidFill>
+                      <a:prstDash val="solid"/>
+                      <a:round/>
+                      <a:headEnd type="none" w="med" len="med"/>
+                      <a:tailEnd type="none" w="med" len="med"/>
+                    </a:lnT>
+                    <a:lnB cmpd="sng" algn="ctr" cap="flat" w="35698">
+                      <a:solidFill>
+                        <a:srgbClr val="000000"/>
+                      </a:solidFill>
+                      <a:prstDash val="solid"/>
+                      <a:round/>
+                      <a:headEnd type="none" w="med" len="med"/>
+                      <a:tailEnd type="none" w="med" len="med"/>
+                    </a:lnB>
+                    <a:solidFill>
+                      <a:srgbClr val="C1B6AA"/>
+                    </a:solidFill>
+                  </a:tcPr>
+                </a:tc>
+                <a:tc hMerge="true">
+                  <a:txBody>
+                    <a:bodyPr anchor="t" rtlCol="false"/>
+                    <a:lstStyle/>
+                    <a:p>
+                      <a:pPr algn="ctr">
+                        <a:lnSpc>
+                          <a:spcPts val="6424"/>
+                        </a:lnSpc>
+                        <a:defRPr/>
+                      </a:pPr>
+                      <a:r>
+                        <a:rPr lang="en-US" sz="4589">
+                          <a:solidFill>
+                            <a:srgbClr val="3C3C3C"/>
+                          </a:solidFill>
+                          <a:latin typeface="Aileron Heavy"/>
+                        </a:rPr>
+                        <a:t>Parameter</a:t>
+                      </a:r>
+                      <a:endParaRPr lang="en-US" sz="1100"/>
+                    </a:p>
+                  </a:txBody>
+                  <a:tcPr marL="178488" marR="178488" marT="178488" marB="178488" anchor="ctr">
+                    <a:lnL cmpd="sng" algn="ctr" cap="flat" w="35698">
+                      <a:solidFill>
+                        <a:srgbClr val="000000"/>
+                      </a:solidFill>
+                      <a:prstDash val="solid"/>
+                      <a:round/>
+                      <a:headEnd type="none" w="med" len="med"/>
+                      <a:tailEnd type="none" w="med" len="med"/>
+                    </a:lnL>
+                    <a:lnR cmpd="sng" algn="ctr" cap="flat" w="35698">
+                      <a:solidFill>
+                        <a:srgbClr val="000000"/>
+                      </a:solidFill>
+                      <a:prstDash val="solid"/>
+                      <a:round/>
+                      <a:headEnd type="none" w="med" len="med"/>
+                      <a:tailEnd type="none" w="med" len="med"/>
+                    </a:lnR>
+                    <a:lnT cmpd="sng" algn="ctr" cap="flat" w="35698">
+                      <a:solidFill>
+                        <a:srgbClr val="000000"/>
+                      </a:solidFill>
+                      <a:prstDash val="solid"/>
+                      <a:round/>
+                      <a:headEnd type="none" w="med" len="med"/>
+                      <a:tailEnd type="none" w="med" len="med"/>
+                    </a:lnT>
+                    <a:lnB cmpd="sng" algn="ctr" cap="flat" w="35698">
+                      <a:solidFill>
+                        <a:srgbClr val="000000"/>
+                      </a:solidFill>
+                      <a:prstDash val="solid"/>
+                      <a:round/>
+                      <a:headEnd type="none" w="med" len="med"/>
+                      <a:tailEnd type="none" w="med" len="med"/>
+                    </a:lnB>
+                    <a:solidFill>
+                      <a:srgbClr val="C1B6AA"/>
+                    </a:solidFill>
+                  </a:tcPr>
+                </a:tc>
+              </a:tr>
+              <a:tr h="1190619">
+                <a:tc>
+                  <a:txBody>
+                    <a:bodyPr anchor="t" rtlCol="false"/>
+                    <a:lstStyle/>
+                    <a:p>
+                      <a:pPr algn="ctr">
+                        <a:lnSpc>
+                          <a:spcPts val="2900"/>
+                        </a:lnSpc>
+                        <a:defRPr/>
+                      </a:pPr>
+                      <a:r>
+                        <a:rPr lang="en-US" sz="2072">
+                          <a:solidFill>
+                            <a:srgbClr val="3C3C3C"/>
+                          </a:solidFill>
+                          <a:latin typeface="Aileron"/>
+                        </a:rPr>
+                        <a:t>Layer</a:t>
+                      </a:r>
+                      <a:endParaRPr lang="en-US" sz="1100"/>
+                    </a:p>
+                  </a:txBody>
+                  <a:tcPr marL="178488" marR="178488" marT="178488" marB="178488" anchor="ctr">
+                    <a:lnL cmpd="sng" algn="ctr" cap="flat" w="35698">
+                      <a:solidFill>
+                        <a:srgbClr val="000000"/>
+                      </a:solidFill>
+                      <a:prstDash val="solid"/>
+                      <a:round/>
+                      <a:headEnd type="none" w="med" len="med"/>
+                      <a:tailEnd type="none" w="med" len="med"/>
+                    </a:lnL>
+                    <a:lnR cmpd="sng" algn="ctr" cap="flat" w="35698">
+                      <a:solidFill>
+                        <a:srgbClr val="000000"/>
+                      </a:solidFill>
+                      <a:prstDash val="solid"/>
+                      <a:round/>
+                      <a:headEnd type="none" w="med" len="med"/>
+                      <a:tailEnd type="none" w="med" len="med"/>
+                    </a:lnR>
+                    <a:lnT cmpd="sng" algn="ctr" cap="flat" w="35698">
+                      <a:solidFill>
+                        <a:srgbClr val="000000"/>
+                      </a:solidFill>
+                      <a:prstDash val="solid"/>
+                      <a:round/>
+                      <a:headEnd type="none" w="med" len="med"/>
+                      <a:tailEnd type="none" w="med" len="med"/>
+                    </a:lnT>
+                    <a:lnB cmpd="sng" algn="ctr" cap="flat" w="35698">
+                      <a:solidFill>
+                        <a:srgbClr val="000000"/>
+                      </a:solidFill>
+                      <a:prstDash val="solid"/>
+                      <a:round/>
+                      <a:headEnd type="none" w="med" len="med"/>
+                      <a:tailEnd type="none" w="med" len="med"/>
+                    </a:lnB>
+                  </a:tcPr>
+                </a:tc>
+                <a:tc>
+                  <a:txBody>
+                    <a:bodyPr anchor="t" rtlCol="false"/>
+                    <a:lstStyle/>
+                    <a:p>
+                      <a:pPr algn="ctr">
+                        <a:lnSpc>
+                          <a:spcPts val="2900"/>
+                        </a:lnSpc>
+                        <a:defRPr/>
+                      </a:pPr>
+                      <a:r>
+                        <a:rPr lang="en-US" sz="2072">
+                          <a:solidFill>
+                            <a:srgbClr val="3C3C3C"/>
+                          </a:solidFill>
+                          <a:latin typeface="Aileron"/>
+                        </a:rPr>
+                        <a:t>Output Layer</a:t>
+                      </a:r>
+                      <a:endParaRPr lang="en-US" sz="1100"/>
+                    </a:p>
+                  </a:txBody>
+                  <a:tcPr marL="178488" marR="178488" marT="178488" marB="178488" anchor="ctr">
+                    <a:lnL cmpd="sng" algn="ctr" cap="flat" w="35698">
+                      <a:solidFill>
+                        <a:srgbClr val="000000"/>
+                      </a:solidFill>
+                      <a:prstDash val="solid"/>
+                      <a:round/>
+                      <a:headEnd type="none" w="med" len="med"/>
+                      <a:tailEnd type="none" w="med" len="med"/>
+                    </a:lnL>
+                    <a:lnR cmpd="sng" algn="ctr" cap="flat" w="35698">
+                      <a:solidFill>
+                        <a:srgbClr val="000000"/>
+                      </a:solidFill>
+                      <a:prstDash val="solid"/>
+                      <a:round/>
+                      <a:headEnd type="none" w="med" len="med"/>
+                      <a:tailEnd type="none" w="med" len="med"/>
+                    </a:lnR>
+                    <a:lnT cmpd="sng" algn="ctr" cap="flat" w="35698">
+                      <a:solidFill>
+                        <a:srgbClr val="000000"/>
+                      </a:solidFill>
+                      <a:prstDash val="solid"/>
+                      <a:round/>
+                      <a:headEnd type="none" w="med" len="med"/>
+                      <a:tailEnd type="none" w="med" len="med"/>
+                    </a:lnT>
+                    <a:lnB cmpd="sng" algn="ctr" cap="flat" w="35698">
+                      <a:solidFill>
+                        <a:srgbClr val="000000"/>
+                      </a:solidFill>
+                      <a:prstDash val="solid"/>
+                      <a:round/>
+                      <a:headEnd type="none" w="med" len="med"/>
+                      <a:tailEnd type="none" w="med" len="med"/>
+                    </a:lnB>
+                  </a:tcPr>
+                </a:tc>
+                <a:tc>
+                  <a:txBody>
+                    <a:bodyPr anchor="t" rtlCol="false"/>
+                    <a:lstStyle/>
+                    <a:p>
+                      <a:pPr algn="ctr">
+                        <a:lnSpc>
+                          <a:spcPts val="2900"/>
+                        </a:lnSpc>
+                        <a:defRPr/>
+                      </a:pPr>
+                      <a:r>
+                        <a:rPr lang="en-US" sz="2072">
+                          <a:solidFill>
+                            <a:srgbClr val="3C3C3C"/>
+                          </a:solidFill>
+                          <a:latin typeface="Aileron"/>
+                        </a:rPr>
+                        <a:t>Activation</a:t>
+                      </a:r>
+                      <a:endParaRPr lang="en-US" sz="1100"/>
+                    </a:p>
+                  </a:txBody>
+                  <a:tcPr marL="178488" marR="178488" marT="178488" marB="178488" anchor="ctr">
+                    <a:lnL cmpd="sng" algn="ctr" cap="flat" w="35698">
+                      <a:solidFill>
+                        <a:srgbClr val="000000"/>
+                      </a:solidFill>
+                      <a:prstDash val="solid"/>
+                      <a:round/>
+                      <a:headEnd type="none" w="med" len="med"/>
+                      <a:tailEnd type="none" w="med" len="med"/>
+                    </a:lnL>
+                    <a:lnR cmpd="sng" algn="ctr" cap="flat" w="35698">
+                      <a:solidFill>
+                        <a:srgbClr val="000000"/>
+                      </a:solidFill>
+                      <a:prstDash val="solid"/>
+                      <a:round/>
+                      <a:headEnd type="none" w="med" len="med"/>
+                      <a:tailEnd type="none" w="med" len="med"/>
+                    </a:lnR>
+                    <a:lnT cmpd="sng" algn="ctr" cap="flat" w="35698">
+                      <a:solidFill>
+                        <a:srgbClr val="000000"/>
+                      </a:solidFill>
+                      <a:prstDash val="solid"/>
+                      <a:round/>
+                      <a:headEnd type="none" w="med" len="med"/>
+                      <a:tailEnd type="none" w="med" len="med"/>
+                    </a:lnT>
+                    <a:lnB cmpd="sng" algn="ctr" cap="flat" w="35698">
+                      <a:solidFill>
+                        <a:srgbClr val="000000"/>
+                      </a:solidFill>
+                      <a:prstDash val="solid"/>
+                      <a:round/>
+                      <a:headEnd type="none" w="med" len="med"/>
+                      <a:tailEnd type="none" w="med" len="med"/>
+                    </a:lnB>
+                  </a:tcPr>
+                </a:tc>
+                <a:tc>
+                  <a:txBody>
+                    <a:bodyPr anchor="t" rtlCol="false"/>
+                    <a:lstStyle/>
+                    <a:p>
+                      <a:pPr algn="ctr">
+                        <a:lnSpc>
+                          <a:spcPts val="2900"/>
+                        </a:lnSpc>
+                        <a:defRPr/>
+                      </a:pPr>
+                      <a:r>
+                        <a:rPr lang="en-US" sz="2072">
+                          <a:solidFill>
+                            <a:srgbClr val="3C3C3C"/>
+                          </a:solidFill>
+                          <a:latin typeface="Aileron"/>
+                        </a:rPr>
+                        <a:t>dropout</a:t>
+                      </a:r>
+                      <a:endParaRPr lang="en-US" sz="1100"/>
+                    </a:p>
+                  </a:txBody>
+                  <a:tcPr marL="178488" marR="178488" marT="178488" marB="178488" anchor="ctr">
+                    <a:lnL cmpd="sng" algn="ctr" cap="flat" w="35698">
+                      <a:solidFill>
+                        <a:srgbClr val="000000"/>
+                      </a:solidFill>
+                      <a:prstDash val="solid"/>
+                      <a:round/>
+                      <a:headEnd type="none" w="med" len="med"/>
+                      <a:tailEnd type="none" w="med" len="med"/>
+                    </a:lnL>
+                    <a:lnR cmpd="sng" algn="ctr" cap="flat" w="35698">
+                      <a:solidFill>
+                        <a:srgbClr val="000000"/>
+                      </a:solidFill>
+                      <a:prstDash val="solid"/>
+                      <a:round/>
+                      <a:headEnd type="none" w="med" len="med"/>
+                      <a:tailEnd type="none" w="med" len="med"/>
+                    </a:lnR>
+                    <a:lnT cmpd="sng" algn="ctr" cap="flat" w="35698">
+                      <a:solidFill>
+                        <a:srgbClr val="000000"/>
+                      </a:solidFill>
+                      <a:prstDash val="solid"/>
+                      <a:round/>
+                      <a:headEnd type="none" w="med" len="med"/>
+                      <a:tailEnd type="none" w="med" len="med"/>
+                    </a:lnT>
+                    <a:lnB cmpd="sng" algn="ctr" cap="flat" w="35698">
+                      <a:solidFill>
+                        <a:srgbClr val="000000"/>
+                      </a:solidFill>
+                      <a:prstDash val="solid"/>
+                      <a:round/>
+                      <a:headEnd type="none" w="med" len="med"/>
+                      <a:tailEnd type="none" w="med" len="med"/>
+                    </a:lnB>
+                  </a:tcPr>
+                </a:tc>
+                <a:tc>
+                  <a:txBody>
+                    <a:bodyPr anchor="t" rtlCol="false"/>
+                    <a:lstStyle/>
+                    <a:p>
+                      <a:pPr algn="ctr">
+                        <a:lnSpc>
+                          <a:spcPts val="2900"/>
+                        </a:lnSpc>
+                        <a:defRPr/>
+                      </a:pPr>
+                      <a:r>
+                        <a:rPr lang="en-US" sz="2072">
+                          <a:solidFill>
+                            <a:srgbClr val="3C3C3C"/>
+                          </a:solidFill>
+                          <a:latin typeface="Aileron"/>
+                        </a:rPr>
+                        <a:t>optimizer</a:t>
+                      </a:r>
+                      <a:endParaRPr lang="en-US" sz="1100"/>
+                    </a:p>
+                  </a:txBody>
+                  <a:tcPr marL="178488" marR="178488" marT="178488" marB="178488" anchor="ctr">
+                    <a:lnL cmpd="sng" algn="ctr" cap="flat" w="35698">
+                      <a:solidFill>
+                        <a:srgbClr val="000000"/>
+                      </a:solidFill>
+                      <a:prstDash val="solid"/>
+                      <a:round/>
+                      <a:headEnd type="none" w="med" len="med"/>
+                      <a:tailEnd type="none" w="med" len="med"/>
+                    </a:lnL>
+                    <a:lnR cmpd="sng" algn="ctr" cap="flat" w="35698">
+                      <a:solidFill>
+                        <a:srgbClr val="000000"/>
+                      </a:solidFill>
+                      <a:prstDash val="solid"/>
+                      <a:round/>
+                      <a:headEnd type="none" w="med" len="med"/>
+                      <a:tailEnd type="none" w="med" len="med"/>
+                    </a:lnR>
+                    <a:lnT cmpd="sng" algn="ctr" cap="flat" w="35698">
+                      <a:solidFill>
+                        <a:srgbClr val="000000"/>
+                      </a:solidFill>
+                      <a:prstDash val="solid"/>
+                      <a:round/>
+                      <a:headEnd type="none" w="med" len="med"/>
+                      <a:tailEnd type="none" w="med" len="med"/>
+                    </a:lnT>
+                    <a:lnB cmpd="sng" algn="ctr" cap="flat" w="35698">
+                      <a:solidFill>
+                        <a:srgbClr val="000000"/>
+                      </a:solidFill>
+                      <a:prstDash val="solid"/>
+                      <a:round/>
+                      <a:headEnd type="none" w="med" len="med"/>
+                      <a:tailEnd type="none" w="med" len="med"/>
+                    </a:lnB>
+                  </a:tcPr>
+                </a:tc>
+                <a:tc>
+                  <a:txBody>
+                    <a:bodyPr anchor="t" rtlCol="false"/>
+                    <a:lstStyle/>
+                    <a:p>
+                      <a:pPr algn="ctr">
+                        <a:lnSpc>
+                          <a:spcPts val="2900"/>
+                        </a:lnSpc>
+                        <a:defRPr/>
+                      </a:pPr>
+                      <a:r>
+                        <a:rPr lang="en-US" sz="2072">
+                          <a:solidFill>
+                            <a:srgbClr val="3C3C3C"/>
+                          </a:solidFill>
+                          <a:latin typeface="Aileron"/>
+                        </a:rPr>
+                        <a:t>Loss</a:t>
+                      </a:r>
+                      <a:endParaRPr lang="en-US" sz="1100"/>
+                    </a:p>
+                  </a:txBody>
+                  <a:tcPr marL="178488" marR="178488" marT="178488" marB="178488" anchor="ctr">
+                    <a:lnL cmpd="sng" algn="ctr" cap="flat" w="35698">
+                      <a:solidFill>
+                        <a:srgbClr val="000000"/>
+                      </a:solidFill>
+                      <a:prstDash val="solid"/>
+                      <a:round/>
+                      <a:headEnd type="none" w="med" len="med"/>
+                      <a:tailEnd type="none" w="med" len="med"/>
+                    </a:lnL>
+                    <a:lnR cmpd="sng" algn="ctr" cap="flat" w="35698">
+                      <a:solidFill>
+                        <a:srgbClr val="000000"/>
+                      </a:solidFill>
+                      <a:prstDash val="solid"/>
+                      <a:round/>
+                      <a:headEnd type="none" w="med" len="med"/>
+                      <a:tailEnd type="none" w="med" len="med"/>
+                    </a:lnR>
+                    <a:lnT cmpd="sng" algn="ctr" cap="flat" w="35698">
+                      <a:solidFill>
+                        <a:srgbClr val="000000"/>
+                      </a:solidFill>
+                      <a:prstDash val="solid"/>
+                      <a:round/>
+                      <a:headEnd type="none" w="med" len="med"/>
+                      <a:tailEnd type="none" w="med" len="med"/>
+                    </a:lnT>
+                    <a:lnB cmpd="sng" algn="ctr" cap="flat" w="35698">
+                      <a:solidFill>
+                        <a:srgbClr val="000000"/>
+                      </a:solidFill>
+                      <a:prstDash val="solid"/>
+                      <a:round/>
+                      <a:headEnd type="none" w="med" len="med"/>
+                      <a:tailEnd type="none" w="med" len="med"/>
+                    </a:lnB>
+                  </a:tcPr>
+                </a:tc>
+                <a:tc>
+                  <a:txBody>
+                    <a:bodyPr anchor="t" rtlCol="false"/>
+                    <a:lstStyle/>
+                    <a:p>
+                      <a:pPr algn="ctr">
+                        <a:lnSpc>
+                          <a:spcPts val="2900"/>
+                        </a:lnSpc>
+                        <a:defRPr/>
+                      </a:pPr>
+                      <a:r>
+                        <a:rPr lang="en-US" sz="2072">
+                          <a:solidFill>
+                            <a:srgbClr val="3C3C3C"/>
+                          </a:solidFill>
+                          <a:latin typeface="Aileron"/>
+                        </a:rPr>
+                        <a:t>Learning Rate</a:t>
+                      </a:r>
+                      <a:endParaRPr lang="en-US" sz="1100"/>
+                    </a:p>
+                  </a:txBody>
+                  <a:tcPr marL="178488" marR="178488" marT="178488" marB="178488" anchor="ctr">
+                    <a:lnL cmpd="sng" algn="ctr" cap="flat" w="35698">
+                      <a:solidFill>
+                        <a:srgbClr val="000000"/>
+                      </a:solidFill>
+                      <a:prstDash val="solid"/>
+                      <a:round/>
+                      <a:headEnd type="none" w="med" len="med"/>
+                      <a:tailEnd type="none" w="med" len="med"/>
+                    </a:lnL>
+                    <a:lnR cmpd="sng" algn="ctr" cap="flat" w="35698">
+                      <a:solidFill>
+                        <a:srgbClr val="000000"/>
+                      </a:solidFill>
+                      <a:prstDash val="solid"/>
+                      <a:round/>
+                      <a:headEnd type="none" w="med" len="med"/>
+                      <a:tailEnd type="none" w="med" len="med"/>
+                    </a:lnR>
+                    <a:lnT cmpd="sng" algn="ctr" cap="flat" w="35698">
+                      <a:solidFill>
+                        <a:srgbClr val="000000"/>
+                      </a:solidFill>
+                      <a:prstDash val="solid"/>
+                      <a:round/>
+                      <a:headEnd type="none" w="med" len="med"/>
+                      <a:tailEnd type="none" w="med" len="med"/>
+                    </a:lnT>
+                    <a:lnB cmpd="sng" algn="ctr" cap="flat" w="35698">
+                      <a:solidFill>
+                        <a:srgbClr val="000000"/>
+                      </a:solidFill>
+                      <a:prstDash val="solid"/>
+                      <a:round/>
+                      <a:headEnd type="none" w="med" len="med"/>
+                      <a:tailEnd type="none" w="med" len="med"/>
+                    </a:lnB>
+                  </a:tcPr>
+                </a:tc>
+                <a:tc>
+                  <a:txBody>
+                    <a:bodyPr anchor="t" rtlCol="false"/>
+                    <a:lstStyle/>
+                    <a:p>
+                      <a:pPr algn="ctr">
+                        <a:lnSpc>
+                          <a:spcPts val="2900"/>
+                        </a:lnSpc>
+                        <a:defRPr/>
+                      </a:pPr>
+                      <a:r>
+                        <a:rPr lang="en-US" sz="2072">
+                          <a:solidFill>
+                            <a:srgbClr val="3C3C3C"/>
+                          </a:solidFill>
+                          <a:latin typeface="Aileron"/>
+                        </a:rPr>
+                        <a:t>Epochs</a:t>
+                      </a:r>
+                      <a:endParaRPr lang="en-US" sz="1100"/>
+                    </a:p>
+                  </a:txBody>
+                  <a:tcPr marL="178488" marR="178488" marT="178488" marB="178488" anchor="ctr">
+                    <a:lnL cmpd="sng" algn="ctr" cap="flat" w="35698">
+                      <a:solidFill>
+                        <a:srgbClr val="000000"/>
+                      </a:solidFill>
+                      <a:prstDash val="solid"/>
+                      <a:round/>
+                      <a:headEnd type="none" w="med" len="med"/>
+                      <a:tailEnd type="none" w="med" len="med"/>
+                    </a:lnL>
+                    <a:lnR cmpd="sng" algn="ctr" cap="flat" w="35698">
+                      <a:solidFill>
+                        <a:srgbClr val="000000"/>
+                      </a:solidFill>
+                      <a:prstDash val="solid"/>
+                      <a:round/>
+                      <a:headEnd type="none" w="med" len="med"/>
+                      <a:tailEnd type="none" w="med" len="med"/>
+                    </a:lnR>
+                    <a:lnT cmpd="sng" algn="ctr" cap="flat" w="35698">
+                      <a:solidFill>
+                        <a:srgbClr val="000000"/>
+                      </a:solidFill>
+                      <a:prstDash val="solid"/>
+                      <a:round/>
+                      <a:headEnd type="none" w="med" len="med"/>
+                      <a:tailEnd type="none" w="med" len="med"/>
+                    </a:lnT>
+                    <a:lnB cmpd="sng" algn="ctr" cap="flat" w="35698">
+                      <a:solidFill>
+                        <a:srgbClr val="000000"/>
+                      </a:solidFill>
+                      <a:prstDash val="solid"/>
+                      <a:round/>
+                      <a:headEnd type="none" w="med" len="med"/>
+                      <a:tailEnd type="none" w="med" len="med"/>
+                    </a:lnB>
+                  </a:tcPr>
+                </a:tc>
+                <a:tc>
+                  <a:txBody>
+                    <a:bodyPr anchor="t" rtlCol="false"/>
+                    <a:lstStyle/>
+                    <a:p>
+                      <a:pPr algn="ctr">
+                        <a:lnSpc>
+                          <a:spcPts val="2900"/>
+                        </a:lnSpc>
+                        <a:defRPr/>
+                      </a:pPr>
+                      <a:r>
+                        <a:rPr lang="en-US" sz="2072">
+                          <a:solidFill>
+                            <a:srgbClr val="3C3C3C"/>
+                          </a:solidFill>
+                          <a:latin typeface="Aileron"/>
+                        </a:rPr>
+                        <a:t>Batch Size</a:t>
+                      </a:r>
+                      <a:endParaRPr lang="en-US" sz="1100"/>
+                    </a:p>
+                  </a:txBody>
+                  <a:tcPr marL="178488" marR="178488" marT="178488" marB="178488" anchor="ctr">
+                    <a:lnL cmpd="sng" algn="ctr" cap="flat" w="35698">
+                      <a:solidFill>
+                        <a:srgbClr val="000000"/>
+                      </a:solidFill>
+                      <a:prstDash val="solid"/>
+                      <a:round/>
+                      <a:headEnd type="none" w="med" len="med"/>
+                      <a:tailEnd type="none" w="med" len="med"/>
+                    </a:lnL>
+                    <a:lnR cmpd="sng" algn="ctr" cap="flat" w="35698">
+                      <a:solidFill>
+                        <a:srgbClr val="000000"/>
+                      </a:solidFill>
+                      <a:prstDash val="solid"/>
+                      <a:round/>
+                      <a:headEnd type="none" w="med" len="med"/>
+                      <a:tailEnd type="none" w="med" len="med"/>
+                    </a:lnR>
+                    <a:lnT cmpd="sng" algn="ctr" cap="flat" w="35698">
+                      <a:solidFill>
+                        <a:srgbClr val="000000"/>
+                      </a:solidFill>
+                      <a:prstDash val="solid"/>
+                      <a:round/>
+                      <a:headEnd type="none" w="med" len="med"/>
+                      <a:tailEnd type="none" w="med" len="med"/>
+                    </a:lnT>
+                    <a:lnB cmpd="sng" algn="ctr" cap="flat" w="35698">
+                      <a:solidFill>
+                        <a:srgbClr val="000000"/>
+                      </a:solidFill>
+                      <a:prstDash val="solid"/>
+                      <a:round/>
+                      <a:headEnd type="none" w="med" len="med"/>
+                      <a:tailEnd type="none" w="med" len="med"/>
+                    </a:lnB>
+                  </a:tcPr>
+                </a:tc>
+              </a:tr>
+              <a:tr h="1920354">
+                <a:tc>
+                  <a:txBody>
+                    <a:bodyPr anchor="t" rtlCol="false"/>
+                    <a:lstStyle/>
+                    <a:p>
+                      <a:pPr algn="ctr">
+                        <a:lnSpc>
+                          <a:spcPts val="2900"/>
+                        </a:lnSpc>
+                        <a:defRPr/>
+                      </a:pPr>
+                      <a:r>
+                        <a:rPr lang="en-US" sz="2072">
+                          <a:solidFill>
+                            <a:srgbClr val="3C3C3C"/>
+                          </a:solidFill>
+                          <a:latin typeface="Aileron"/>
+                        </a:rPr>
+                        <a:t>64 , 32</a:t>
+                      </a:r>
+                      <a:endParaRPr lang="en-US" sz="1100"/>
+                    </a:p>
+                  </a:txBody>
+                  <a:tcPr marL="178488" marR="178488" marT="178488" marB="178488" anchor="ctr">
+                    <a:lnL cmpd="sng" algn="ctr" cap="flat" w="35698">
+                      <a:solidFill>
+                        <a:srgbClr val="000000"/>
+                      </a:solidFill>
+                      <a:prstDash val="solid"/>
+                      <a:round/>
+                      <a:headEnd type="none" w="med" len="med"/>
+                      <a:tailEnd type="none" w="med" len="med"/>
+                    </a:lnL>
+                    <a:lnR cmpd="sng" algn="ctr" cap="flat" w="35698">
+                      <a:solidFill>
+                        <a:srgbClr val="000000"/>
+                      </a:solidFill>
+                      <a:prstDash val="solid"/>
+                      <a:round/>
+                      <a:headEnd type="none" w="med" len="med"/>
+                      <a:tailEnd type="none" w="med" len="med"/>
+                    </a:lnR>
+                    <a:lnT cmpd="sng" algn="ctr" cap="flat" w="35698">
+                      <a:solidFill>
+                        <a:srgbClr val="000000"/>
+                      </a:solidFill>
+                      <a:prstDash val="solid"/>
+                      <a:round/>
+                      <a:headEnd type="none" w="med" len="med"/>
+                      <a:tailEnd type="none" w="med" len="med"/>
+                    </a:lnT>
+                    <a:lnB cmpd="sng" algn="ctr" cap="flat" w="35698">
+                      <a:solidFill>
+                        <a:srgbClr val="000000"/>
+                      </a:solidFill>
+                      <a:prstDash val="solid"/>
+                      <a:round/>
+                      <a:headEnd type="none" w="med" len="med"/>
+                      <a:tailEnd type="none" w="med" len="med"/>
+                    </a:lnB>
+                  </a:tcPr>
+                </a:tc>
+                <a:tc>
+                  <a:txBody>
+                    <a:bodyPr anchor="t" rtlCol="false"/>
+                    <a:lstStyle/>
+                    <a:p>
+                      <a:pPr algn="ctr">
+                        <a:lnSpc>
+                          <a:spcPts val="2900"/>
+                        </a:lnSpc>
+                        <a:defRPr/>
+                      </a:pPr>
+                      <a:r>
+                        <a:rPr lang="en-US" sz="2072">
+                          <a:solidFill>
+                            <a:srgbClr val="3C3C3C"/>
+                          </a:solidFill>
+                          <a:latin typeface="Aileron"/>
+                        </a:rPr>
+                        <a:t>3</a:t>
+                      </a:r>
+                      <a:endParaRPr lang="en-US" sz="1100"/>
+                    </a:p>
+                  </a:txBody>
+                  <a:tcPr marL="178488" marR="178488" marT="178488" marB="178488" anchor="ctr">
+                    <a:lnL cmpd="sng" algn="ctr" cap="flat" w="35698">
+                      <a:solidFill>
+                        <a:srgbClr val="000000"/>
+                      </a:solidFill>
+                      <a:prstDash val="solid"/>
+                      <a:round/>
+                      <a:headEnd type="none" w="med" len="med"/>
+                      <a:tailEnd type="none" w="med" len="med"/>
+                    </a:lnL>
+                    <a:lnR cmpd="sng" algn="ctr" cap="flat" w="35698">
+                      <a:solidFill>
+                        <a:srgbClr val="000000"/>
+                      </a:solidFill>
+                      <a:prstDash val="solid"/>
+                      <a:round/>
+                      <a:headEnd type="none" w="med" len="med"/>
+                      <a:tailEnd type="none" w="med" len="med"/>
+                    </a:lnR>
+                    <a:lnT cmpd="sng" algn="ctr" cap="flat" w="35698">
+                      <a:solidFill>
+                        <a:srgbClr val="000000"/>
+                      </a:solidFill>
+                      <a:prstDash val="solid"/>
+                      <a:round/>
+                      <a:headEnd type="none" w="med" len="med"/>
+                      <a:tailEnd type="none" w="med" len="med"/>
+                    </a:lnT>
+                    <a:lnB cmpd="sng" algn="ctr" cap="flat" w="35698">
+                      <a:solidFill>
+                        <a:srgbClr val="000000"/>
+                      </a:solidFill>
+                      <a:prstDash val="solid"/>
+                      <a:round/>
+                      <a:headEnd type="none" w="med" len="med"/>
+                      <a:tailEnd type="none" w="med" len="med"/>
+                    </a:lnB>
+                  </a:tcPr>
+                </a:tc>
+                <a:tc>
+                  <a:txBody>
+                    <a:bodyPr anchor="t" rtlCol="false"/>
+                    <a:lstStyle/>
+                    <a:p>
+                      <a:pPr algn="ctr">
+                        <a:lnSpc>
+                          <a:spcPts val="2900"/>
+                        </a:lnSpc>
+                        <a:defRPr/>
+                      </a:pPr>
+                      <a:r>
+                        <a:rPr lang="en-US" sz="2072">
+                          <a:solidFill>
+                            <a:srgbClr val="3C3C3C"/>
+                          </a:solidFill>
+                          <a:latin typeface="Aileron"/>
+                        </a:rPr>
+                        <a:t>Softmax</a:t>
+                      </a:r>
+                      <a:endParaRPr lang="en-US" sz="1100"/>
+                    </a:p>
+                  </a:txBody>
+                  <a:tcPr marL="178488" marR="178488" marT="178488" marB="178488" anchor="ctr">
+                    <a:lnL cmpd="sng" algn="ctr" cap="flat" w="35698">
+                      <a:solidFill>
+                        <a:srgbClr val="000000"/>
+                      </a:solidFill>
+                      <a:prstDash val="solid"/>
+                      <a:round/>
+                      <a:headEnd type="none" w="med" len="med"/>
+                      <a:tailEnd type="none" w="med" len="med"/>
+                    </a:lnL>
+                    <a:lnR cmpd="sng" algn="ctr" cap="flat" w="35698">
+                      <a:solidFill>
+                        <a:srgbClr val="000000"/>
+                      </a:solidFill>
+                      <a:prstDash val="solid"/>
+                      <a:round/>
+                      <a:headEnd type="none" w="med" len="med"/>
+                      <a:tailEnd type="none" w="med" len="med"/>
+                    </a:lnR>
+                    <a:lnT cmpd="sng" algn="ctr" cap="flat" w="35698">
+                      <a:solidFill>
+                        <a:srgbClr val="000000"/>
+                      </a:solidFill>
+                      <a:prstDash val="solid"/>
+                      <a:round/>
+                      <a:headEnd type="none" w="med" len="med"/>
+                      <a:tailEnd type="none" w="med" len="med"/>
+                    </a:lnT>
+                    <a:lnB cmpd="sng" algn="ctr" cap="flat" w="35698">
+                      <a:solidFill>
+                        <a:srgbClr val="000000"/>
+                      </a:solidFill>
+                      <a:prstDash val="solid"/>
+                      <a:round/>
+                      <a:headEnd type="none" w="med" len="med"/>
+                      <a:tailEnd type="none" w="med" len="med"/>
+                    </a:lnB>
+                  </a:tcPr>
+                </a:tc>
+                <a:tc>
+                  <a:txBody>
+                    <a:bodyPr anchor="t" rtlCol="false"/>
+                    <a:lstStyle/>
+                    <a:p>
+                      <a:pPr algn="ctr">
+                        <a:lnSpc>
+                          <a:spcPts val="2900"/>
+                        </a:lnSpc>
+                        <a:defRPr/>
+                      </a:pPr>
+                      <a:r>
+                        <a:rPr lang="en-US" sz="2072">
+                          <a:solidFill>
+                            <a:srgbClr val="3C3C3C"/>
+                          </a:solidFill>
+                          <a:latin typeface="Aileron"/>
+                        </a:rPr>
+                        <a:t>0.5</a:t>
+                      </a:r>
+                      <a:endParaRPr lang="en-US" sz="1100"/>
+                    </a:p>
+                  </a:txBody>
+                  <a:tcPr marL="178488" marR="178488" marT="178488" marB="178488" anchor="ctr">
+                    <a:lnL cmpd="sng" algn="ctr" cap="flat" w="35698">
+                      <a:solidFill>
+                        <a:srgbClr val="000000"/>
+                      </a:solidFill>
+                      <a:prstDash val="solid"/>
+                      <a:round/>
+                      <a:headEnd type="none" w="med" len="med"/>
+                      <a:tailEnd type="none" w="med" len="med"/>
+                    </a:lnL>
+                    <a:lnR cmpd="sng" algn="ctr" cap="flat" w="35698">
+                      <a:solidFill>
+                        <a:srgbClr val="000000"/>
+                      </a:solidFill>
+                      <a:prstDash val="solid"/>
+                      <a:round/>
+                      <a:headEnd type="none" w="med" len="med"/>
+                      <a:tailEnd type="none" w="med" len="med"/>
+                    </a:lnR>
+                    <a:lnT cmpd="sng" algn="ctr" cap="flat" w="35698">
+                      <a:solidFill>
+                        <a:srgbClr val="000000"/>
+                      </a:solidFill>
+                      <a:prstDash val="solid"/>
+                      <a:round/>
+                      <a:headEnd type="none" w="med" len="med"/>
+                      <a:tailEnd type="none" w="med" len="med"/>
+                    </a:lnT>
+                    <a:lnB cmpd="sng" algn="ctr" cap="flat" w="35698">
+                      <a:solidFill>
+                        <a:srgbClr val="000000"/>
+                      </a:solidFill>
+                      <a:prstDash val="solid"/>
+                      <a:round/>
+                      <a:headEnd type="none" w="med" len="med"/>
+                      <a:tailEnd type="none" w="med" len="med"/>
+                    </a:lnB>
+                  </a:tcPr>
+                </a:tc>
+                <a:tc>
+                  <a:txBody>
+                    <a:bodyPr anchor="t" rtlCol="false"/>
+                    <a:lstStyle/>
+                    <a:p>
+                      <a:pPr algn="ctr">
+                        <a:lnSpc>
+                          <a:spcPts val="2900"/>
+                        </a:lnSpc>
+                        <a:defRPr/>
+                      </a:pPr>
+                      <a:r>
+                        <a:rPr lang="en-US" sz="2072">
+                          <a:solidFill>
+                            <a:srgbClr val="3C3C3C"/>
+                          </a:solidFill>
+                          <a:latin typeface="Aileron"/>
+                        </a:rPr>
+                        <a:t>Adam</a:t>
+                      </a:r>
+                      <a:endParaRPr lang="en-US" sz="1100"/>
+                    </a:p>
+                  </a:txBody>
+                  <a:tcPr marL="178488" marR="178488" marT="178488" marB="178488" anchor="ctr">
+                    <a:lnL cmpd="sng" algn="ctr" cap="flat" w="35698">
+                      <a:solidFill>
+                        <a:srgbClr val="000000"/>
+                      </a:solidFill>
+                      <a:prstDash val="solid"/>
+                      <a:round/>
+                      <a:headEnd type="none" w="med" len="med"/>
+                      <a:tailEnd type="none" w="med" len="med"/>
+                    </a:lnL>
+                    <a:lnR cmpd="sng" algn="ctr" cap="flat" w="35698">
+                      <a:solidFill>
+                        <a:srgbClr val="000000"/>
+                      </a:solidFill>
+                      <a:prstDash val="solid"/>
+                      <a:round/>
+                      <a:headEnd type="none" w="med" len="med"/>
+                      <a:tailEnd type="none" w="med" len="med"/>
+                    </a:lnR>
+                    <a:lnT cmpd="sng" algn="ctr" cap="flat" w="35698">
+                      <a:solidFill>
+                        <a:srgbClr val="000000"/>
+                      </a:solidFill>
+                      <a:prstDash val="solid"/>
+                      <a:round/>
+                      <a:headEnd type="none" w="med" len="med"/>
+                      <a:tailEnd type="none" w="med" len="med"/>
+                    </a:lnT>
+                    <a:lnB cmpd="sng" algn="ctr" cap="flat" w="35698">
+                      <a:solidFill>
+                        <a:srgbClr val="000000"/>
+                      </a:solidFill>
+                      <a:prstDash val="solid"/>
+                      <a:round/>
+                      <a:headEnd type="none" w="med" len="med"/>
+                      <a:tailEnd type="none" w="med" len="med"/>
+                    </a:lnB>
+                  </a:tcPr>
+                </a:tc>
+                <a:tc>
+                  <a:txBody>
+                    <a:bodyPr anchor="t" rtlCol="false"/>
+                    <a:lstStyle/>
+                    <a:p>
+                      <a:pPr algn="ctr">
+                        <a:lnSpc>
+                          <a:spcPts val="2900"/>
+                        </a:lnSpc>
+                        <a:defRPr/>
+                      </a:pPr>
+                      <a:r>
+                        <a:rPr lang="en-US" sz="2072">
+                          <a:solidFill>
+                            <a:srgbClr val="3C3C3C"/>
+                          </a:solidFill>
+                          <a:latin typeface="Aileron"/>
+                        </a:rPr>
+                        <a:t>Categorical Crossentropy</a:t>
+                      </a:r>
+                      <a:endParaRPr lang="en-US" sz="1100"/>
+                    </a:p>
+                  </a:txBody>
+                  <a:tcPr marL="178488" marR="178488" marT="178488" marB="178488" anchor="ctr">
+                    <a:lnL cmpd="sng" algn="ctr" cap="flat" w="35698">
+                      <a:solidFill>
+                        <a:srgbClr val="000000"/>
+                      </a:solidFill>
+                      <a:prstDash val="solid"/>
+                      <a:round/>
+                      <a:headEnd type="none" w="med" len="med"/>
+                      <a:tailEnd type="none" w="med" len="med"/>
+                    </a:lnL>
+                    <a:lnR cmpd="sng" algn="ctr" cap="flat" w="35698">
+                      <a:solidFill>
+                        <a:srgbClr val="000000"/>
+                      </a:solidFill>
+                      <a:prstDash val="solid"/>
+                      <a:round/>
+                      <a:headEnd type="none" w="med" len="med"/>
+                      <a:tailEnd type="none" w="med" len="med"/>
+                    </a:lnR>
+                    <a:lnT cmpd="sng" algn="ctr" cap="flat" w="35698">
+                      <a:solidFill>
+                        <a:srgbClr val="000000"/>
+                      </a:solidFill>
+                      <a:prstDash val="solid"/>
+                      <a:round/>
+                      <a:headEnd type="none" w="med" len="med"/>
+                      <a:tailEnd type="none" w="med" len="med"/>
+                    </a:lnT>
+                    <a:lnB cmpd="sng" algn="ctr" cap="flat" w="35698">
+                      <a:solidFill>
+                        <a:srgbClr val="000000"/>
+                      </a:solidFill>
+                      <a:prstDash val="solid"/>
+                      <a:round/>
+                      <a:headEnd type="none" w="med" len="med"/>
+                      <a:tailEnd type="none" w="med" len="med"/>
+                    </a:lnB>
+                  </a:tcPr>
+                </a:tc>
+                <a:tc>
+                  <a:txBody>
+                    <a:bodyPr anchor="t" rtlCol="false"/>
+                    <a:lstStyle/>
+                    <a:p>
+                      <a:pPr algn="ctr">
+                        <a:lnSpc>
+                          <a:spcPts val="2900"/>
+                        </a:lnSpc>
+                        <a:defRPr/>
+                      </a:pPr>
+                      <a:r>
+                        <a:rPr lang="en-US" sz="2072">
+                          <a:solidFill>
+                            <a:srgbClr val="3C3C3C"/>
+                          </a:solidFill>
+                          <a:latin typeface="Aileron"/>
+                        </a:rPr>
+                        <a:t>0.0001</a:t>
+                      </a:r>
+                      <a:endParaRPr lang="en-US" sz="1100"/>
+                    </a:p>
+                  </a:txBody>
+                  <a:tcPr marL="178488" marR="178488" marT="178488" marB="178488" anchor="ctr">
+                    <a:lnL cmpd="sng" algn="ctr" cap="flat" w="35698">
+                      <a:solidFill>
+                        <a:srgbClr val="000000"/>
+                      </a:solidFill>
+                      <a:prstDash val="solid"/>
+                      <a:round/>
+                      <a:headEnd type="none" w="med" len="med"/>
+                      <a:tailEnd type="none" w="med" len="med"/>
+                    </a:lnL>
+                    <a:lnR cmpd="sng" algn="ctr" cap="flat" w="35698">
+                      <a:solidFill>
+                        <a:srgbClr val="000000"/>
+                      </a:solidFill>
+                      <a:prstDash val="solid"/>
+                      <a:round/>
+                      <a:headEnd type="none" w="med" len="med"/>
+                      <a:tailEnd type="none" w="med" len="med"/>
+                    </a:lnR>
+                    <a:lnT cmpd="sng" algn="ctr" cap="flat" w="35698">
+                      <a:solidFill>
+                        <a:srgbClr val="000000"/>
+                      </a:solidFill>
+                      <a:prstDash val="solid"/>
+                      <a:round/>
+                      <a:headEnd type="none" w="med" len="med"/>
+                      <a:tailEnd type="none" w="med" len="med"/>
+                    </a:lnT>
+                    <a:lnB cmpd="sng" algn="ctr" cap="flat" w="35698">
+                      <a:solidFill>
+                        <a:srgbClr val="000000"/>
+                      </a:solidFill>
+                      <a:prstDash val="solid"/>
+                      <a:round/>
+                      <a:headEnd type="none" w="med" len="med"/>
+                      <a:tailEnd type="none" w="med" len="med"/>
+                    </a:lnB>
+                  </a:tcPr>
+                </a:tc>
+                <a:tc>
+                  <a:txBody>
+                    <a:bodyPr anchor="t" rtlCol="false"/>
+                    <a:lstStyle/>
+                    <a:p>
+                      <a:pPr algn="ctr">
+                        <a:lnSpc>
+                          <a:spcPts val="2900"/>
+                        </a:lnSpc>
+                        <a:defRPr/>
+                      </a:pPr>
+                      <a:r>
+                        <a:rPr lang="en-US" sz="2072">
+                          <a:solidFill>
+                            <a:srgbClr val="3C3C3C"/>
+                          </a:solidFill>
+                          <a:latin typeface="Aileron"/>
+                        </a:rPr>
+                        <a:t>30</a:t>
+                      </a:r>
+                      <a:endParaRPr lang="en-US" sz="1100"/>
+                    </a:p>
+                  </a:txBody>
+                  <a:tcPr marL="178488" marR="178488" marT="178488" marB="178488" anchor="ctr">
+                    <a:lnL cmpd="sng" algn="ctr" cap="flat" w="35698">
+                      <a:solidFill>
+                        <a:srgbClr val="000000"/>
+                      </a:solidFill>
+                      <a:prstDash val="solid"/>
+                      <a:round/>
+                      <a:headEnd type="none" w="med" len="med"/>
+                      <a:tailEnd type="none" w="med" len="med"/>
+                    </a:lnL>
+                    <a:lnR cmpd="sng" algn="ctr" cap="flat" w="35698">
+                      <a:solidFill>
+                        <a:srgbClr val="000000"/>
+                      </a:solidFill>
+                      <a:prstDash val="solid"/>
+                      <a:round/>
+                      <a:headEnd type="none" w="med" len="med"/>
+                      <a:tailEnd type="none" w="med" len="med"/>
+                    </a:lnR>
+                    <a:lnT cmpd="sng" algn="ctr" cap="flat" w="35698">
+                      <a:solidFill>
+                        <a:srgbClr val="000000"/>
+                      </a:solidFill>
+                      <a:prstDash val="solid"/>
+                      <a:round/>
+                      <a:headEnd type="none" w="med" len="med"/>
+                      <a:tailEnd type="none" w="med" len="med"/>
+                    </a:lnT>
+                    <a:lnB cmpd="sng" algn="ctr" cap="flat" w="35698">
+                      <a:solidFill>
+                        <a:srgbClr val="000000"/>
+                      </a:solidFill>
+                      <a:prstDash val="solid"/>
+                      <a:round/>
+                      <a:headEnd type="none" w="med" len="med"/>
+                      <a:tailEnd type="none" w="med" len="med"/>
+                    </a:lnB>
+                  </a:tcPr>
+                </a:tc>
+                <a:tc>
+                  <a:txBody>
+                    <a:bodyPr anchor="t" rtlCol="false"/>
+                    <a:lstStyle/>
+                    <a:p>
+                      <a:pPr algn="ctr">
+                        <a:lnSpc>
+                          <a:spcPts val="2900"/>
+                        </a:lnSpc>
+                        <a:defRPr/>
+                      </a:pPr>
+                      <a:r>
+                        <a:rPr lang="en-US" sz="2072">
+                          <a:solidFill>
+                            <a:srgbClr val="3C3C3C"/>
+                          </a:solidFill>
+                          <a:latin typeface="Aileron"/>
+                        </a:rPr>
+                        <a:t>64</a:t>
+                      </a:r>
+                      <a:endParaRPr lang="en-US" sz="1100"/>
+                    </a:p>
+                  </a:txBody>
+                  <a:tcPr marL="178488" marR="178488" marT="178488" marB="178488" anchor="ctr">
+                    <a:lnL cmpd="sng" algn="ctr" cap="flat" w="35698">
+                      <a:solidFill>
+                        <a:srgbClr val="000000"/>
+                      </a:solidFill>
+                      <a:prstDash val="solid"/>
+                      <a:round/>
+                      <a:headEnd type="none" w="med" len="med"/>
+                      <a:tailEnd type="none" w="med" len="med"/>
+                    </a:lnL>
+                    <a:lnR cmpd="sng" algn="ctr" cap="flat" w="35698">
+                      <a:solidFill>
+                        <a:srgbClr val="000000"/>
+                      </a:solidFill>
+                      <a:prstDash val="solid"/>
+                      <a:round/>
+                      <a:headEnd type="none" w="med" len="med"/>
+                      <a:tailEnd type="none" w="med" len="med"/>
+                    </a:lnR>
+                    <a:lnT cmpd="sng" algn="ctr" cap="flat" w="35698">
+                      <a:solidFill>
+                        <a:srgbClr val="000000"/>
+                      </a:solidFill>
+                      <a:prstDash val="solid"/>
+                      <a:round/>
+                      <a:headEnd type="none" w="med" len="med"/>
+                      <a:tailEnd type="none" w="med" len="med"/>
+                    </a:lnT>
+                    <a:lnB cmpd="sng" algn="ctr" cap="flat" w="35698">
+                      <a:solidFill>
+                        <a:srgbClr val="000000"/>
+                      </a:solidFill>
+                      <a:prstDash val="solid"/>
+                      <a:round/>
+                      <a:headEnd type="none" w="med" len="med"/>
+                      <a:tailEnd type="none" w="med" len="med"/>
+                    </a:lnB>
+                  </a:tcPr>
+                </a:tc>
+              </a:tr>
+            </a:tbl>
+          </a:graphicData>
+        </a:graphic>
+      </p:graphicFrame>
+      <p:sp>
+        <p:nvSpPr>
+          <p:cNvPr name="TextBox 3" id="3"/>
           <p:cNvSpPr txBox="true"/>
           <p:nvPr/>
         </p:nvSpPr>
         <p:spPr>
           <a:xfrm rot="0">
-            <a:off x="3731361" y="300595"/>
-            <a:ext cx="10825278" cy="2858776"/>
+            <a:off x="1931068" y="7010511"/>
+            <a:ext cx="4753008" cy="1536066"/>
           </a:xfrm>
           <a:prstGeom prst="rect">
             <a:avLst/>
@@ -10017,65 +12048,52 @@
           </a:bodyPr>
           <a:lstStyle/>
           <a:p>
-            <a:pPr algn="ctr">
+            <a:pPr>
               <a:lnSpc>
-                <a:spcPts val="7490"/>
+                <a:spcPts val="6159"/>
               </a:lnSpc>
             </a:pPr>
             <a:r>
-              <a:rPr lang="en-US" sz="7000">
+              <a:rPr lang="en-US" sz="4399">
                 <a:solidFill>
-                  <a:srgbClr val="3C3C3C"/>
+                  <a:srgbClr val="000000"/>
                 </a:solidFill>
                 <a:latin typeface="Aileron Heavy"/>
               </a:rPr>
-              <a:t>HASIL</a:t>
+              <a:t>MLP </a:t>
             </a:r>
           </a:p>
           <a:p>
-            <a:pPr algn="ctr">
+            <a:pPr algn="l" marL="0" indent="0" lvl="0">
               <a:lnSpc>
-                <a:spcPts val="7490"/>
+                <a:spcPts val="6159"/>
               </a:lnSpc>
+              <a:spcBef>
+                <a:spcPct val="0"/>
+              </a:spcBef>
             </a:pPr>
             <a:r>
-              <a:rPr lang="en-US" sz="7000">
+              <a:rPr lang="en-US" sz="4399">
                 <a:solidFill>
-                  <a:srgbClr val="3C3C3C"/>
+                  <a:srgbClr val="000000"/>
                 </a:solidFill>
                 <a:latin typeface="Aileron Heavy"/>
               </a:rPr>
-              <a:t>SENTIMENT </a:t>
+              <a:t>Classifier</a:t>
             </a:r>
           </a:p>
-          <a:p>
-            <a:pPr algn="ctr">
-              <a:lnSpc>
-                <a:spcPts val="7490"/>
-              </a:lnSpc>
-            </a:pPr>
-            <a:r>
-              <a:rPr lang="en-US" sz="7000">
-                <a:solidFill>
-                  <a:srgbClr val="3C3C3C"/>
-                </a:solidFill>
-                <a:latin typeface="Aileron Heavy"/>
-              </a:rPr>
-              <a:t>ANALYSIS</a:t>
-            </a:r>
-          </a:p>
         </p:txBody>
       </p:sp>
       <p:sp>
         <p:nvSpPr>
-          <p:cNvPr name="TextBox 12" id="12"/>
+          <p:cNvPr name="TextBox 4" id="4"/>
           <p:cNvSpPr txBox="true"/>
           <p:nvPr/>
         </p:nvSpPr>
         <p:spPr>
           <a:xfrm rot="0">
-            <a:off x="2654305" y="3550202"/>
-            <a:ext cx="5042850" cy="697425"/>
+            <a:off x="1931068" y="2825364"/>
+            <a:ext cx="4884439" cy="755016"/>
           </a:xfrm>
           <a:prstGeom prst="rect">
             <a:avLst/>
@@ -10087,33 +12105,1519 @@
           </a:bodyPr>
           <a:lstStyle/>
           <a:p>
-            <a:pPr algn="ctr">
+            <a:pPr algn="l" marL="0" indent="0" lvl="0">
               <a:lnSpc>
-                <a:spcPts val="5400"/>
+                <a:spcPts val="6159"/>
               </a:lnSpc>
+              <a:spcBef>
+                <a:spcPct val="0"/>
+              </a:spcBef>
             </a:pPr>
             <a:r>
-              <a:rPr lang="en-US" sz="4576">
+              <a:rPr lang="en-US" sz="4399">
                 <a:solidFill>
-                  <a:srgbClr val="CA5E28"/>
+                  <a:srgbClr val="000000"/>
                 </a:solidFill>
-                <a:latin typeface="Montserrat Classic Bold"/>
+                <a:latin typeface="Aileron Heavy"/>
               </a:rPr>
-              <a:t>MLP</a:t>
+              <a:t>LSTM</a:t>
             </a:r>
           </a:p>
         </p:txBody>
       </p:sp>
-      <p:sp>
-        <p:nvSpPr>
-          <p:cNvPr name="TextBox 13" id="13"/>
+      <p:graphicFrame>
+        <p:nvGraphicFramePr>
+          <p:cNvPr name="Table 5" id="5"/>
+          <p:cNvGraphicFramePr>
+            <a:graphicFrameLocks noGrp="true"/>
+          </p:cNvGraphicFramePr>
+          <p:nvPr/>
+        </p:nvGraphicFramePr>
+        <p:xfrm>
+          <a:off x="5097211" y="5547769"/>
+          <a:ext cx="12162089" cy="4139862"/>
+        </p:xfrm>
+        <a:graphic>
+          <a:graphicData uri="http://schemas.openxmlformats.org/drawingml/2006/table">
+            <a:tbl>
+              <a:tblPr/>
+              <a:tblGrid>
+                <a:gridCol w="1737441"/>
+                <a:gridCol w="1737441"/>
+                <a:gridCol w="1737441"/>
+                <a:gridCol w="1737441"/>
+                <a:gridCol w="1737441"/>
+                <a:gridCol w="1737441"/>
+                <a:gridCol w="1737441"/>
+              </a:tblGrid>
+              <a:tr h="1220197">
+                <a:tc gridSpan="7">
+                  <a:txBody>
+                    <a:bodyPr anchor="t" rtlCol="false"/>
+                    <a:lstStyle/>
+                    <a:p>
+                      <a:pPr algn="ctr">
+                        <a:lnSpc>
+                          <a:spcPts val="6424"/>
+                        </a:lnSpc>
+                        <a:defRPr/>
+                      </a:pPr>
+                      <a:r>
+                        <a:rPr lang="en-US" sz="4589">
+                          <a:solidFill>
+                            <a:srgbClr val="3C3C3C"/>
+                          </a:solidFill>
+                          <a:latin typeface="Aileron Heavy"/>
+                        </a:rPr>
+                        <a:t>Parameter</a:t>
+                      </a:r>
+                      <a:endParaRPr lang="en-US" sz="1100"/>
+                    </a:p>
+                  </a:txBody>
+                  <a:tcPr marL="178488" marR="178488" marT="178488" marB="178488" anchor="ctr">
+                    <a:lnL cmpd="sng" algn="ctr" cap="flat" w="35698">
+                      <a:solidFill>
+                        <a:srgbClr val="000000"/>
+                      </a:solidFill>
+                      <a:prstDash val="solid"/>
+                      <a:round/>
+                      <a:headEnd type="none" w="med" len="med"/>
+                      <a:tailEnd type="none" w="med" len="med"/>
+                    </a:lnL>
+                    <a:lnR cmpd="sng" algn="ctr" cap="flat" w="35698">
+                      <a:solidFill>
+                        <a:srgbClr val="000000"/>
+                      </a:solidFill>
+                      <a:prstDash val="solid"/>
+                      <a:round/>
+                      <a:headEnd type="none" w="med" len="med"/>
+                      <a:tailEnd type="none" w="med" len="med"/>
+                    </a:lnR>
+                    <a:lnT cmpd="sng" algn="ctr" cap="flat" w="35698">
+                      <a:solidFill>
+                        <a:srgbClr val="000000"/>
+                      </a:solidFill>
+                      <a:prstDash val="solid"/>
+                      <a:round/>
+                      <a:headEnd type="none" w="med" len="med"/>
+                      <a:tailEnd type="none" w="med" len="med"/>
+                    </a:lnT>
+                    <a:lnB cmpd="sng" algn="ctr" cap="flat" w="35698">
+                      <a:solidFill>
+                        <a:srgbClr val="000000"/>
+                      </a:solidFill>
+                      <a:prstDash val="solid"/>
+                      <a:round/>
+                      <a:headEnd type="none" w="med" len="med"/>
+                      <a:tailEnd type="none" w="med" len="med"/>
+                    </a:lnB>
+                    <a:solidFill>
+                      <a:srgbClr val="C1B6AA"/>
+                    </a:solidFill>
+                  </a:tcPr>
+                </a:tc>
+                <a:tc hMerge="true">
+                  <a:txBody>
+                    <a:bodyPr anchor="t" rtlCol="false"/>
+                    <a:lstStyle/>
+                    <a:p>
+                      <a:pPr algn="ctr">
+                        <a:lnSpc>
+                          <a:spcPts val="6424"/>
+                        </a:lnSpc>
+                        <a:defRPr/>
+                      </a:pPr>
+                      <a:r>
+                        <a:rPr lang="en-US" sz="4589">
+                          <a:solidFill>
+                            <a:srgbClr val="3C3C3C"/>
+                          </a:solidFill>
+                          <a:latin typeface="Aileron Heavy"/>
+                        </a:rPr>
+                        <a:t>Parameter</a:t>
+                      </a:r>
+                      <a:endParaRPr lang="en-US" sz="1100"/>
+                    </a:p>
+                  </a:txBody>
+                  <a:tcPr marL="178488" marR="178488" marT="178488" marB="178488" anchor="ctr">
+                    <a:lnL cmpd="sng" algn="ctr" cap="flat" w="35698">
+                      <a:solidFill>
+                        <a:srgbClr val="000000"/>
+                      </a:solidFill>
+                      <a:prstDash val="solid"/>
+                      <a:round/>
+                      <a:headEnd type="none" w="med" len="med"/>
+                      <a:tailEnd type="none" w="med" len="med"/>
+                    </a:lnL>
+                    <a:lnR cmpd="sng" algn="ctr" cap="flat" w="35698">
+                      <a:solidFill>
+                        <a:srgbClr val="000000"/>
+                      </a:solidFill>
+                      <a:prstDash val="solid"/>
+                      <a:round/>
+                      <a:headEnd type="none" w="med" len="med"/>
+                      <a:tailEnd type="none" w="med" len="med"/>
+                    </a:lnR>
+                    <a:lnT cmpd="sng" algn="ctr" cap="flat" w="35698">
+                      <a:solidFill>
+                        <a:srgbClr val="000000"/>
+                      </a:solidFill>
+                      <a:prstDash val="solid"/>
+                      <a:round/>
+                      <a:headEnd type="none" w="med" len="med"/>
+                      <a:tailEnd type="none" w="med" len="med"/>
+                    </a:lnT>
+                    <a:lnB cmpd="sng" algn="ctr" cap="flat" w="35698">
+                      <a:solidFill>
+                        <a:srgbClr val="000000"/>
+                      </a:solidFill>
+                      <a:prstDash val="solid"/>
+                      <a:round/>
+                      <a:headEnd type="none" w="med" len="med"/>
+                      <a:tailEnd type="none" w="med" len="med"/>
+                    </a:lnB>
+                    <a:solidFill>
+                      <a:srgbClr val="C1B6AA"/>
+                    </a:solidFill>
+                  </a:tcPr>
+                </a:tc>
+                <a:tc hMerge="true">
+                  <a:txBody>
+                    <a:bodyPr anchor="t" rtlCol="false"/>
+                    <a:lstStyle/>
+                    <a:p>
+                      <a:pPr algn="ctr">
+                        <a:lnSpc>
+                          <a:spcPts val="6424"/>
+                        </a:lnSpc>
+                        <a:defRPr/>
+                      </a:pPr>
+                      <a:r>
+                        <a:rPr lang="en-US" sz="4589">
+                          <a:solidFill>
+                            <a:srgbClr val="3C3C3C"/>
+                          </a:solidFill>
+                          <a:latin typeface="Aileron Heavy"/>
+                        </a:rPr>
+                        <a:t>Parameter</a:t>
+                      </a:r>
+                      <a:endParaRPr lang="en-US" sz="1100"/>
+                    </a:p>
+                  </a:txBody>
+                  <a:tcPr marL="178488" marR="178488" marT="178488" marB="178488" anchor="ctr">
+                    <a:lnL cmpd="sng" algn="ctr" cap="flat" w="35698">
+                      <a:solidFill>
+                        <a:srgbClr val="000000"/>
+                      </a:solidFill>
+                      <a:prstDash val="solid"/>
+                      <a:round/>
+                      <a:headEnd type="none" w="med" len="med"/>
+                      <a:tailEnd type="none" w="med" len="med"/>
+                    </a:lnL>
+                    <a:lnR cmpd="sng" algn="ctr" cap="flat" w="35698">
+                      <a:solidFill>
+                        <a:srgbClr val="000000"/>
+                      </a:solidFill>
+                      <a:prstDash val="solid"/>
+                      <a:round/>
+                      <a:headEnd type="none" w="med" len="med"/>
+                      <a:tailEnd type="none" w="med" len="med"/>
+                    </a:lnR>
+                    <a:lnT cmpd="sng" algn="ctr" cap="flat" w="35698">
+                      <a:solidFill>
+                        <a:srgbClr val="000000"/>
+                      </a:solidFill>
+                      <a:prstDash val="solid"/>
+                      <a:round/>
+                      <a:headEnd type="none" w="med" len="med"/>
+                      <a:tailEnd type="none" w="med" len="med"/>
+                    </a:lnT>
+                    <a:lnB cmpd="sng" algn="ctr" cap="flat" w="35698">
+                      <a:solidFill>
+                        <a:srgbClr val="000000"/>
+                      </a:solidFill>
+                      <a:prstDash val="solid"/>
+                      <a:round/>
+                      <a:headEnd type="none" w="med" len="med"/>
+                      <a:tailEnd type="none" w="med" len="med"/>
+                    </a:lnB>
+                    <a:solidFill>
+                      <a:srgbClr val="C1B6AA"/>
+                    </a:solidFill>
+                  </a:tcPr>
+                </a:tc>
+                <a:tc hMerge="true">
+                  <a:txBody>
+                    <a:bodyPr anchor="t" rtlCol="false"/>
+                    <a:lstStyle/>
+                    <a:p>
+                      <a:pPr algn="ctr">
+                        <a:lnSpc>
+                          <a:spcPts val="6424"/>
+                        </a:lnSpc>
+                        <a:defRPr/>
+                      </a:pPr>
+                      <a:r>
+                        <a:rPr lang="en-US" sz="4589">
+                          <a:solidFill>
+                            <a:srgbClr val="3C3C3C"/>
+                          </a:solidFill>
+                          <a:latin typeface="Aileron Heavy"/>
+                        </a:rPr>
+                        <a:t>Parameter</a:t>
+                      </a:r>
+                      <a:endParaRPr lang="en-US" sz="1100"/>
+                    </a:p>
+                  </a:txBody>
+                  <a:tcPr marL="178488" marR="178488" marT="178488" marB="178488" anchor="ctr">
+                    <a:lnL cmpd="sng" algn="ctr" cap="flat" w="35698">
+                      <a:solidFill>
+                        <a:srgbClr val="000000"/>
+                      </a:solidFill>
+                      <a:prstDash val="solid"/>
+                      <a:round/>
+                      <a:headEnd type="none" w="med" len="med"/>
+                      <a:tailEnd type="none" w="med" len="med"/>
+                    </a:lnL>
+                    <a:lnR cmpd="sng" algn="ctr" cap="flat" w="35698">
+                      <a:solidFill>
+                        <a:srgbClr val="000000"/>
+                      </a:solidFill>
+                      <a:prstDash val="solid"/>
+                      <a:round/>
+                      <a:headEnd type="none" w="med" len="med"/>
+                      <a:tailEnd type="none" w="med" len="med"/>
+                    </a:lnR>
+                    <a:lnT cmpd="sng" algn="ctr" cap="flat" w="35698">
+                      <a:solidFill>
+                        <a:srgbClr val="000000"/>
+                      </a:solidFill>
+                      <a:prstDash val="solid"/>
+                      <a:round/>
+                      <a:headEnd type="none" w="med" len="med"/>
+                      <a:tailEnd type="none" w="med" len="med"/>
+                    </a:lnT>
+                    <a:lnB cmpd="sng" algn="ctr" cap="flat" w="35698">
+                      <a:solidFill>
+                        <a:srgbClr val="000000"/>
+                      </a:solidFill>
+                      <a:prstDash val="solid"/>
+                      <a:round/>
+                      <a:headEnd type="none" w="med" len="med"/>
+                      <a:tailEnd type="none" w="med" len="med"/>
+                    </a:lnB>
+                    <a:solidFill>
+                      <a:srgbClr val="C1B6AA"/>
+                    </a:solidFill>
+                  </a:tcPr>
+                </a:tc>
+                <a:tc hMerge="true">
+                  <a:txBody>
+                    <a:bodyPr anchor="t" rtlCol="false"/>
+                    <a:lstStyle/>
+                    <a:p>
+                      <a:pPr algn="ctr">
+                        <a:lnSpc>
+                          <a:spcPts val="6424"/>
+                        </a:lnSpc>
+                        <a:defRPr/>
+                      </a:pPr>
+                      <a:r>
+                        <a:rPr lang="en-US" sz="4589">
+                          <a:solidFill>
+                            <a:srgbClr val="3C3C3C"/>
+                          </a:solidFill>
+                          <a:latin typeface="Aileron Heavy"/>
+                        </a:rPr>
+                        <a:t>Parameter</a:t>
+                      </a:r>
+                      <a:endParaRPr lang="en-US" sz="1100"/>
+                    </a:p>
+                  </a:txBody>
+                  <a:tcPr marL="178488" marR="178488" marT="178488" marB="178488" anchor="ctr">
+                    <a:lnL cmpd="sng" algn="ctr" cap="flat" w="35698">
+                      <a:solidFill>
+                        <a:srgbClr val="000000"/>
+                      </a:solidFill>
+                      <a:prstDash val="solid"/>
+                      <a:round/>
+                      <a:headEnd type="none" w="med" len="med"/>
+                      <a:tailEnd type="none" w="med" len="med"/>
+                    </a:lnL>
+                    <a:lnR cmpd="sng" algn="ctr" cap="flat" w="35698">
+                      <a:solidFill>
+                        <a:srgbClr val="000000"/>
+                      </a:solidFill>
+                      <a:prstDash val="solid"/>
+                      <a:round/>
+                      <a:headEnd type="none" w="med" len="med"/>
+                      <a:tailEnd type="none" w="med" len="med"/>
+                    </a:lnR>
+                    <a:lnT cmpd="sng" algn="ctr" cap="flat" w="35698">
+                      <a:solidFill>
+                        <a:srgbClr val="000000"/>
+                      </a:solidFill>
+                      <a:prstDash val="solid"/>
+                      <a:round/>
+                      <a:headEnd type="none" w="med" len="med"/>
+                      <a:tailEnd type="none" w="med" len="med"/>
+                    </a:lnT>
+                    <a:lnB cmpd="sng" algn="ctr" cap="flat" w="35698">
+                      <a:solidFill>
+                        <a:srgbClr val="000000"/>
+                      </a:solidFill>
+                      <a:prstDash val="solid"/>
+                      <a:round/>
+                      <a:headEnd type="none" w="med" len="med"/>
+                      <a:tailEnd type="none" w="med" len="med"/>
+                    </a:lnB>
+                    <a:solidFill>
+                      <a:srgbClr val="C1B6AA"/>
+                    </a:solidFill>
+                  </a:tcPr>
+                </a:tc>
+                <a:tc hMerge="true">
+                  <a:txBody>
+                    <a:bodyPr anchor="t" rtlCol="false"/>
+                    <a:lstStyle/>
+                    <a:p>
+                      <a:pPr algn="ctr">
+                        <a:lnSpc>
+                          <a:spcPts val="6424"/>
+                        </a:lnSpc>
+                        <a:defRPr/>
+                      </a:pPr>
+                      <a:r>
+                        <a:rPr lang="en-US" sz="4589">
+                          <a:solidFill>
+                            <a:srgbClr val="3C3C3C"/>
+                          </a:solidFill>
+                          <a:latin typeface="Aileron Heavy"/>
+                        </a:rPr>
+                        <a:t>Parameter</a:t>
+                      </a:r>
+                      <a:endParaRPr lang="en-US" sz="1100"/>
+                    </a:p>
+                  </a:txBody>
+                  <a:tcPr marL="178488" marR="178488" marT="178488" marB="178488" anchor="ctr">
+                    <a:lnL cmpd="sng" algn="ctr" cap="flat" w="35698">
+                      <a:solidFill>
+                        <a:srgbClr val="000000"/>
+                      </a:solidFill>
+                      <a:prstDash val="solid"/>
+                      <a:round/>
+                      <a:headEnd type="none" w="med" len="med"/>
+                      <a:tailEnd type="none" w="med" len="med"/>
+                    </a:lnL>
+                    <a:lnR cmpd="sng" algn="ctr" cap="flat" w="35698">
+                      <a:solidFill>
+                        <a:srgbClr val="000000"/>
+                      </a:solidFill>
+                      <a:prstDash val="solid"/>
+                      <a:round/>
+                      <a:headEnd type="none" w="med" len="med"/>
+                      <a:tailEnd type="none" w="med" len="med"/>
+                    </a:lnR>
+                    <a:lnT cmpd="sng" algn="ctr" cap="flat" w="35698">
+                      <a:solidFill>
+                        <a:srgbClr val="000000"/>
+                      </a:solidFill>
+                      <a:prstDash val="solid"/>
+                      <a:round/>
+                      <a:headEnd type="none" w="med" len="med"/>
+                      <a:tailEnd type="none" w="med" len="med"/>
+                    </a:lnT>
+                    <a:lnB cmpd="sng" algn="ctr" cap="flat" w="35698">
+                      <a:solidFill>
+                        <a:srgbClr val="000000"/>
+                      </a:solidFill>
+                      <a:prstDash val="solid"/>
+                      <a:round/>
+                      <a:headEnd type="none" w="med" len="med"/>
+                      <a:tailEnd type="none" w="med" len="med"/>
+                    </a:lnB>
+                    <a:solidFill>
+                      <a:srgbClr val="C1B6AA"/>
+                    </a:solidFill>
+                  </a:tcPr>
+                </a:tc>
+                <a:tc hMerge="true">
+                  <a:txBody>
+                    <a:bodyPr anchor="t" rtlCol="false"/>
+                    <a:lstStyle/>
+                    <a:p>
+                      <a:pPr algn="ctr">
+                        <a:lnSpc>
+                          <a:spcPts val="6424"/>
+                        </a:lnSpc>
+                        <a:defRPr/>
+                      </a:pPr>
+                      <a:r>
+                        <a:rPr lang="en-US" sz="4589">
+                          <a:solidFill>
+                            <a:srgbClr val="3C3C3C"/>
+                          </a:solidFill>
+                          <a:latin typeface="Aileron Heavy"/>
+                        </a:rPr>
+                        <a:t>Parameter</a:t>
+                      </a:r>
+                      <a:endParaRPr lang="en-US" sz="1100"/>
+                    </a:p>
+                  </a:txBody>
+                  <a:tcPr marL="178488" marR="178488" marT="178488" marB="178488" anchor="ctr">
+                    <a:lnL cmpd="sng" algn="ctr" cap="flat" w="35698">
+                      <a:solidFill>
+                        <a:srgbClr val="000000"/>
+                      </a:solidFill>
+                      <a:prstDash val="solid"/>
+                      <a:round/>
+                      <a:headEnd type="none" w="med" len="med"/>
+                      <a:tailEnd type="none" w="med" len="med"/>
+                    </a:lnL>
+                    <a:lnR cmpd="sng" algn="ctr" cap="flat" w="35698">
+                      <a:solidFill>
+                        <a:srgbClr val="000000"/>
+                      </a:solidFill>
+                      <a:prstDash val="solid"/>
+                      <a:round/>
+                      <a:headEnd type="none" w="med" len="med"/>
+                      <a:tailEnd type="none" w="med" len="med"/>
+                    </a:lnR>
+                    <a:lnT cmpd="sng" algn="ctr" cap="flat" w="35698">
+                      <a:solidFill>
+                        <a:srgbClr val="000000"/>
+                      </a:solidFill>
+                      <a:prstDash val="solid"/>
+                      <a:round/>
+                      <a:headEnd type="none" w="med" len="med"/>
+                      <a:tailEnd type="none" w="med" len="med"/>
+                    </a:lnT>
+                    <a:lnB cmpd="sng" algn="ctr" cap="flat" w="35698">
+                      <a:solidFill>
+                        <a:srgbClr val="000000"/>
+                      </a:solidFill>
+                      <a:prstDash val="solid"/>
+                      <a:round/>
+                      <a:headEnd type="none" w="med" len="med"/>
+                      <a:tailEnd type="none" w="med" len="med"/>
+                    </a:lnB>
+                    <a:solidFill>
+                      <a:srgbClr val="C1B6AA"/>
+                    </a:solidFill>
+                  </a:tcPr>
+                </a:tc>
+              </a:tr>
+              <a:tr h="1133726">
+                <a:tc>
+                  <a:txBody>
+                    <a:bodyPr anchor="t" rtlCol="false"/>
+                    <a:lstStyle/>
+                    <a:p>
+                      <a:pPr algn="ctr">
+                        <a:lnSpc>
+                          <a:spcPts val="2900"/>
+                        </a:lnSpc>
+                        <a:defRPr/>
+                      </a:pPr>
+                      <a:r>
+                        <a:rPr lang="en-US" sz="2072">
+                          <a:solidFill>
+                            <a:srgbClr val="3C3C3C"/>
+                          </a:solidFill>
+                          <a:latin typeface="Aileron"/>
+                        </a:rPr>
+                        <a:t>Hideen Layer</a:t>
+                      </a:r>
+                      <a:endParaRPr lang="en-US" sz="1100"/>
+                    </a:p>
+                  </a:txBody>
+                  <a:tcPr marL="178488" marR="178488" marT="178488" marB="178488" anchor="ctr">
+                    <a:lnL cmpd="sng" algn="ctr" cap="flat" w="35698">
+                      <a:solidFill>
+                        <a:srgbClr val="000000"/>
+                      </a:solidFill>
+                      <a:prstDash val="solid"/>
+                      <a:round/>
+                      <a:headEnd type="none" w="med" len="med"/>
+                      <a:tailEnd type="none" w="med" len="med"/>
+                    </a:lnL>
+                    <a:lnR cmpd="sng" algn="ctr" cap="flat" w="35698">
+                      <a:solidFill>
+                        <a:srgbClr val="000000"/>
+                      </a:solidFill>
+                      <a:prstDash val="solid"/>
+                      <a:round/>
+                      <a:headEnd type="none" w="med" len="med"/>
+                      <a:tailEnd type="none" w="med" len="med"/>
+                    </a:lnR>
+                    <a:lnT cmpd="sng" algn="ctr" cap="flat" w="35698">
+                      <a:solidFill>
+                        <a:srgbClr val="000000"/>
+                      </a:solidFill>
+                      <a:prstDash val="solid"/>
+                      <a:round/>
+                      <a:headEnd type="none" w="med" len="med"/>
+                      <a:tailEnd type="none" w="med" len="med"/>
+                    </a:lnT>
+                    <a:lnB cmpd="sng" algn="ctr" cap="flat" w="35698">
+                      <a:solidFill>
+                        <a:srgbClr val="000000"/>
+                      </a:solidFill>
+                      <a:prstDash val="solid"/>
+                      <a:round/>
+                      <a:headEnd type="none" w="med" len="med"/>
+                      <a:tailEnd type="none" w="med" len="med"/>
+                    </a:lnB>
+                  </a:tcPr>
+                </a:tc>
+                <a:tc>
+                  <a:txBody>
+                    <a:bodyPr anchor="t" rtlCol="false"/>
+                    <a:lstStyle/>
+                    <a:p>
+                      <a:pPr algn="ctr">
+                        <a:lnSpc>
+                          <a:spcPts val="2900"/>
+                        </a:lnSpc>
+                        <a:defRPr/>
+                      </a:pPr>
+                      <a:r>
+                        <a:rPr lang="en-US" sz="2072">
+                          <a:solidFill>
+                            <a:srgbClr val="3C3C3C"/>
+                          </a:solidFill>
+                          <a:latin typeface="Aileron"/>
+                        </a:rPr>
+                        <a:t>Max_Itter</a:t>
+                      </a:r>
+                      <a:endParaRPr lang="en-US" sz="1100"/>
+                    </a:p>
+                  </a:txBody>
+                  <a:tcPr marL="178488" marR="178488" marT="178488" marB="178488" anchor="ctr">
+                    <a:lnL cmpd="sng" algn="ctr" cap="flat" w="35698">
+                      <a:solidFill>
+                        <a:srgbClr val="000000"/>
+                      </a:solidFill>
+                      <a:prstDash val="solid"/>
+                      <a:round/>
+                      <a:headEnd type="none" w="med" len="med"/>
+                      <a:tailEnd type="none" w="med" len="med"/>
+                    </a:lnL>
+                    <a:lnR cmpd="sng" algn="ctr" cap="flat" w="35698">
+                      <a:solidFill>
+                        <a:srgbClr val="000000"/>
+                      </a:solidFill>
+                      <a:prstDash val="solid"/>
+                      <a:round/>
+                      <a:headEnd type="none" w="med" len="med"/>
+                      <a:tailEnd type="none" w="med" len="med"/>
+                    </a:lnR>
+                    <a:lnT cmpd="sng" algn="ctr" cap="flat" w="35698">
+                      <a:solidFill>
+                        <a:srgbClr val="000000"/>
+                      </a:solidFill>
+                      <a:prstDash val="solid"/>
+                      <a:round/>
+                      <a:headEnd type="none" w="med" len="med"/>
+                      <a:tailEnd type="none" w="med" len="med"/>
+                    </a:lnT>
+                    <a:lnB cmpd="sng" algn="ctr" cap="flat" w="35698">
+                      <a:solidFill>
+                        <a:srgbClr val="000000"/>
+                      </a:solidFill>
+                      <a:prstDash val="solid"/>
+                      <a:round/>
+                      <a:headEnd type="none" w="med" len="med"/>
+                      <a:tailEnd type="none" w="med" len="med"/>
+                    </a:lnB>
+                  </a:tcPr>
+                </a:tc>
+                <a:tc>
+                  <a:txBody>
+                    <a:bodyPr anchor="t" rtlCol="false"/>
+                    <a:lstStyle/>
+                    <a:p>
+                      <a:pPr algn="ctr">
+                        <a:lnSpc>
+                          <a:spcPts val="2900"/>
+                        </a:lnSpc>
+                        <a:defRPr/>
+                      </a:pPr>
+                      <a:r>
+                        <a:rPr lang="en-US" sz="2072">
+                          <a:solidFill>
+                            <a:srgbClr val="3C3C3C"/>
+                          </a:solidFill>
+                          <a:latin typeface="Aileron"/>
+                        </a:rPr>
+                        <a:t>Activation</a:t>
+                      </a:r>
+                      <a:endParaRPr lang="en-US" sz="1100"/>
+                    </a:p>
+                  </a:txBody>
+                  <a:tcPr marL="178488" marR="178488" marT="178488" marB="178488" anchor="ctr">
+                    <a:lnL cmpd="sng" algn="ctr" cap="flat" w="35698">
+                      <a:solidFill>
+                        <a:srgbClr val="000000"/>
+                      </a:solidFill>
+                      <a:prstDash val="solid"/>
+                      <a:round/>
+                      <a:headEnd type="none" w="med" len="med"/>
+                      <a:tailEnd type="none" w="med" len="med"/>
+                    </a:lnL>
+                    <a:lnR cmpd="sng" algn="ctr" cap="flat" w="35698">
+                      <a:solidFill>
+                        <a:srgbClr val="000000"/>
+                      </a:solidFill>
+                      <a:prstDash val="solid"/>
+                      <a:round/>
+                      <a:headEnd type="none" w="med" len="med"/>
+                      <a:tailEnd type="none" w="med" len="med"/>
+                    </a:lnR>
+                    <a:lnT cmpd="sng" algn="ctr" cap="flat" w="35698">
+                      <a:solidFill>
+                        <a:srgbClr val="000000"/>
+                      </a:solidFill>
+                      <a:prstDash val="solid"/>
+                      <a:round/>
+                      <a:headEnd type="none" w="med" len="med"/>
+                      <a:tailEnd type="none" w="med" len="med"/>
+                    </a:lnT>
+                    <a:lnB cmpd="sng" algn="ctr" cap="flat" w="35698">
+                      <a:solidFill>
+                        <a:srgbClr val="000000"/>
+                      </a:solidFill>
+                      <a:prstDash val="solid"/>
+                      <a:round/>
+                      <a:headEnd type="none" w="med" len="med"/>
+                      <a:tailEnd type="none" w="med" len="med"/>
+                    </a:lnB>
+                  </a:tcPr>
+                </a:tc>
+                <a:tc>
+                  <a:txBody>
+                    <a:bodyPr anchor="t" rtlCol="false"/>
+                    <a:lstStyle/>
+                    <a:p>
+                      <a:pPr algn="ctr">
+                        <a:lnSpc>
+                          <a:spcPts val="2900"/>
+                        </a:lnSpc>
+                        <a:defRPr/>
+                      </a:pPr>
+                      <a:r>
+                        <a:rPr lang="en-US" sz="2072">
+                          <a:solidFill>
+                            <a:srgbClr val="3C3C3C"/>
+                          </a:solidFill>
+                          <a:latin typeface="Aileron"/>
+                        </a:rPr>
+                        <a:t>Alpha</a:t>
+                      </a:r>
+                      <a:endParaRPr lang="en-US" sz="1100"/>
+                    </a:p>
+                  </a:txBody>
+                  <a:tcPr marL="178488" marR="178488" marT="178488" marB="178488" anchor="ctr">
+                    <a:lnL cmpd="sng" algn="ctr" cap="flat" w="35698">
+                      <a:solidFill>
+                        <a:srgbClr val="000000"/>
+                      </a:solidFill>
+                      <a:prstDash val="solid"/>
+                      <a:round/>
+                      <a:headEnd type="none" w="med" len="med"/>
+                      <a:tailEnd type="none" w="med" len="med"/>
+                    </a:lnL>
+                    <a:lnR cmpd="sng" algn="ctr" cap="flat" w="35698">
+                      <a:solidFill>
+                        <a:srgbClr val="000000"/>
+                      </a:solidFill>
+                      <a:prstDash val="solid"/>
+                      <a:round/>
+                      <a:headEnd type="none" w="med" len="med"/>
+                      <a:tailEnd type="none" w="med" len="med"/>
+                    </a:lnR>
+                    <a:lnT cmpd="sng" algn="ctr" cap="flat" w="35698">
+                      <a:solidFill>
+                        <a:srgbClr val="000000"/>
+                      </a:solidFill>
+                      <a:prstDash val="solid"/>
+                      <a:round/>
+                      <a:headEnd type="none" w="med" len="med"/>
+                      <a:tailEnd type="none" w="med" len="med"/>
+                    </a:lnT>
+                    <a:lnB cmpd="sng" algn="ctr" cap="flat" w="35698">
+                      <a:solidFill>
+                        <a:srgbClr val="000000"/>
+                      </a:solidFill>
+                      <a:prstDash val="solid"/>
+                      <a:round/>
+                      <a:headEnd type="none" w="med" len="med"/>
+                      <a:tailEnd type="none" w="med" len="med"/>
+                    </a:lnB>
+                  </a:tcPr>
+                </a:tc>
+                <a:tc>
+                  <a:txBody>
+                    <a:bodyPr anchor="t" rtlCol="false"/>
+                    <a:lstStyle/>
+                    <a:p>
+                      <a:pPr algn="ctr">
+                        <a:lnSpc>
+                          <a:spcPts val="2900"/>
+                        </a:lnSpc>
+                        <a:defRPr/>
+                      </a:pPr>
+                      <a:r>
+                        <a:rPr lang="en-US" sz="2072">
+                          <a:solidFill>
+                            <a:srgbClr val="3C3C3C"/>
+                          </a:solidFill>
+                          <a:latin typeface="Aileron"/>
+                        </a:rPr>
+                        <a:t>Solver</a:t>
+                      </a:r>
+                      <a:endParaRPr lang="en-US" sz="1100"/>
+                    </a:p>
+                  </a:txBody>
+                  <a:tcPr marL="178488" marR="178488" marT="178488" marB="178488" anchor="ctr">
+                    <a:lnL cmpd="sng" algn="ctr" cap="flat" w="35698">
+                      <a:solidFill>
+                        <a:srgbClr val="000000"/>
+                      </a:solidFill>
+                      <a:prstDash val="solid"/>
+                      <a:round/>
+                      <a:headEnd type="none" w="med" len="med"/>
+                      <a:tailEnd type="none" w="med" len="med"/>
+                    </a:lnL>
+                    <a:lnR cmpd="sng" algn="ctr" cap="flat" w="35698">
+                      <a:solidFill>
+                        <a:srgbClr val="000000"/>
+                      </a:solidFill>
+                      <a:prstDash val="solid"/>
+                      <a:round/>
+                      <a:headEnd type="none" w="med" len="med"/>
+                      <a:tailEnd type="none" w="med" len="med"/>
+                    </a:lnR>
+                    <a:lnT cmpd="sng" algn="ctr" cap="flat" w="35698">
+                      <a:solidFill>
+                        <a:srgbClr val="000000"/>
+                      </a:solidFill>
+                      <a:prstDash val="solid"/>
+                      <a:round/>
+                      <a:headEnd type="none" w="med" len="med"/>
+                      <a:tailEnd type="none" w="med" len="med"/>
+                    </a:lnT>
+                    <a:lnB cmpd="sng" algn="ctr" cap="flat" w="35698">
+                      <a:solidFill>
+                        <a:srgbClr val="000000"/>
+                      </a:solidFill>
+                      <a:prstDash val="solid"/>
+                      <a:round/>
+                      <a:headEnd type="none" w="med" len="med"/>
+                      <a:tailEnd type="none" w="med" len="med"/>
+                    </a:lnB>
+                  </a:tcPr>
+                </a:tc>
+                <a:tc>
+                  <a:txBody>
+                    <a:bodyPr anchor="t" rtlCol="false"/>
+                    <a:lstStyle/>
+                    <a:p>
+                      <a:pPr algn="ctr">
+                        <a:lnSpc>
+                          <a:spcPts val="2900"/>
+                        </a:lnSpc>
+                        <a:defRPr/>
+                      </a:pPr>
+                      <a:r>
+                        <a:rPr lang="en-US" sz="2072">
+                          <a:solidFill>
+                            <a:srgbClr val="3C3C3C"/>
+                          </a:solidFill>
+                          <a:latin typeface="Aileron"/>
+                        </a:rPr>
+                        <a:t>epsilon</a:t>
+                      </a:r>
+                      <a:endParaRPr lang="en-US" sz="1100"/>
+                    </a:p>
+                  </a:txBody>
+                  <a:tcPr marL="178488" marR="178488" marT="178488" marB="178488" anchor="ctr">
+                    <a:lnL cmpd="sng" algn="ctr" cap="flat" w="35698">
+                      <a:solidFill>
+                        <a:srgbClr val="000000"/>
+                      </a:solidFill>
+                      <a:prstDash val="solid"/>
+                      <a:round/>
+                      <a:headEnd type="none" w="med" len="med"/>
+                      <a:tailEnd type="none" w="med" len="med"/>
+                    </a:lnL>
+                    <a:lnR cmpd="sng" algn="ctr" cap="flat" w="35698">
+                      <a:solidFill>
+                        <a:srgbClr val="000000"/>
+                      </a:solidFill>
+                      <a:prstDash val="solid"/>
+                      <a:round/>
+                      <a:headEnd type="none" w="med" len="med"/>
+                      <a:tailEnd type="none" w="med" len="med"/>
+                    </a:lnR>
+                    <a:lnT cmpd="sng" algn="ctr" cap="flat" w="35698">
+                      <a:solidFill>
+                        <a:srgbClr val="000000"/>
+                      </a:solidFill>
+                      <a:prstDash val="solid"/>
+                      <a:round/>
+                      <a:headEnd type="none" w="med" len="med"/>
+                      <a:tailEnd type="none" w="med" len="med"/>
+                    </a:lnT>
+                    <a:lnB cmpd="sng" algn="ctr" cap="flat" w="35698">
+                      <a:solidFill>
+                        <a:srgbClr val="000000"/>
+                      </a:solidFill>
+                      <a:prstDash val="solid"/>
+                      <a:round/>
+                      <a:headEnd type="none" w="med" len="med"/>
+                      <a:tailEnd type="none" w="med" len="med"/>
+                    </a:lnB>
+                  </a:tcPr>
+                </a:tc>
+                <a:tc>
+                  <a:txBody>
+                    <a:bodyPr anchor="t" rtlCol="false"/>
+                    <a:lstStyle/>
+                    <a:p>
+                      <a:pPr algn="ctr">
+                        <a:lnSpc>
+                          <a:spcPts val="2900"/>
+                        </a:lnSpc>
+                        <a:defRPr/>
+                      </a:pPr>
+                      <a:r>
+                        <a:rPr lang="en-US" sz="2072">
+                          <a:solidFill>
+                            <a:srgbClr val="3C3C3C"/>
+                          </a:solidFill>
+                          <a:latin typeface="Aileron"/>
+                        </a:rPr>
+                        <a:t>Learning Rate</a:t>
+                      </a:r>
+                      <a:endParaRPr lang="en-US" sz="1100"/>
+                    </a:p>
+                  </a:txBody>
+                  <a:tcPr marL="178488" marR="178488" marT="178488" marB="178488" anchor="ctr">
+                    <a:lnL cmpd="sng" algn="ctr" cap="flat" w="35698">
+                      <a:solidFill>
+                        <a:srgbClr val="000000"/>
+                      </a:solidFill>
+                      <a:prstDash val="solid"/>
+                      <a:round/>
+                      <a:headEnd type="none" w="med" len="med"/>
+                      <a:tailEnd type="none" w="med" len="med"/>
+                    </a:lnL>
+                    <a:lnR cmpd="sng" algn="ctr" cap="flat" w="35698">
+                      <a:solidFill>
+                        <a:srgbClr val="000000"/>
+                      </a:solidFill>
+                      <a:prstDash val="solid"/>
+                      <a:round/>
+                      <a:headEnd type="none" w="med" len="med"/>
+                      <a:tailEnd type="none" w="med" len="med"/>
+                    </a:lnR>
+                    <a:lnT cmpd="sng" algn="ctr" cap="flat" w="35698">
+                      <a:solidFill>
+                        <a:srgbClr val="000000"/>
+                      </a:solidFill>
+                      <a:prstDash val="solid"/>
+                      <a:round/>
+                      <a:headEnd type="none" w="med" len="med"/>
+                      <a:tailEnd type="none" w="med" len="med"/>
+                    </a:lnT>
+                    <a:lnB cmpd="sng" algn="ctr" cap="flat" w="35698">
+                      <a:solidFill>
+                        <a:srgbClr val="000000"/>
+                      </a:solidFill>
+                      <a:prstDash val="solid"/>
+                      <a:round/>
+                      <a:headEnd type="none" w="med" len="med"/>
+                      <a:tailEnd type="none" w="med" len="med"/>
+                    </a:lnB>
+                  </a:tcPr>
+                </a:tc>
+              </a:tr>
+              <a:tr h="1785940">
+                <a:tc>
+                  <a:txBody>
+                    <a:bodyPr anchor="t" rtlCol="false"/>
+                    <a:lstStyle/>
+                    <a:p>
+                      <a:pPr algn="ctr">
+                        <a:lnSpc>
+                          <a:spcPts val="2900"/>
+                        </a:lnSpc>
+                        <a:defRPr/>
+                      </a:pPr>
+                      <a:r>
+                        <a:rPr lang="en-US" sz="2072">
+                          <a:solidFill>
+                            <a:srgbClr val="3C3C3C"/>
+                          </a:solidFill>
+                          <a:latin typeface="Aileron"/>
+                        </a:rPr>
+                        <a:t>30</a:t>
+                      </a:r>
+                      <a:endParaRPr lang="en-US" sz="1100"/>
+                    </a:p>
+                  </a:txBody>
+                  <a:tcPr marL="178488" marR="178488" marT="178488" marB="178488" anchor="ctr">
+                    <a:lnL cmpd="sng" algn="ctr" cap="flat" w="35698">
+                      <a:solidFill>
+                        <a:srgbClr val="000000"/>
+                      </a:solidFill>
+                      <a:prstDash val="solid"/>
+                      <a:round/>
+                      <a:headEnd type="none" w="med" len="med"/>
+                      <a:tailEnd type="none" w="med" len="med"/>
+                    </a:lnL>
+                    <a:lnR cmpd="sng" algn="ctr" cap="flat" w="35698">
+                      <a:solidFill>
+                        <a:srgbClr val="000000"/>
+                      </a:solidFill>
+                      <a:prstDash val="solid"/>
+                      <a:round/>
+                      <a:headEnd type="none" w="med" len="med"/>
+                      <a:tailEnd type="none" w="med" len="med"/>
+                    </a:lnR>
+                    <a:lnT cmpd="sng" algn="ctr" cap="flat" w="35698">
+                      <a:solidFill>
+                        <a:srgbClr val="000000"/>
+                      </a:solidFill>
+                      <a:prstDash val="solid"/>
+                      <a:round/>
+                      <a:headEnd type="none" w="med" len="med"/>
+                      <a:tailEnd type="none" w="med" len="med"/>
+                    </a:lnT>
+                    <a:lnB cmpd="sng" algn="ctr" cap="flat" w="35698">
+                      <a:solidFill>
+                        <a:srgbClr val="000000"/>
+                      </a:solidFill>
+                      <a:prstDash val="solid"/>
+                      <a:round/>
+                      <a:headEnd type="none" w="med" len="med"/>
+                      <a:tailEnd type="none" w="med" len="med"/>
+                    </a:lnB>
+                  </a:tcPr>
+                </a:tc>
+                <a:tc>
+                  <a:txBody>
+                    <a:bodyPr anchor="t" rtlCol="false"/>
+                    <a:lstStyle/>
+                    <a:p>
+                      <a:pPr algn="ctr">
+                        <a:lnSpc>
+                          <a:spcPts val="2900"/>
+                        </a:lnSpc>
+                        <a:defRPr/>
+                      </a:pPr>
+                      <a:r>
+                        <a:rPr lang="en-US" sz="2072">
+                          <a:solidFill>
+                            <a:srgbClr val="3C3C3C"/>
+                          </a:solidFill>
+                          <a:latin typeface="Aileron"/>
+                        </a:rPr>
+                        <a:t>100</a:t>
+                      </a:r>
+                      <a:endParaRPr lang="en-US" sz="1100"/>
+                    </a:p>
+                  </a:txBody>
+                  <a:tcPr marL="178488" marR="178488" marT="178488" marB="178488" anchor="ctr">
+                    <a:lnL cmpd="sng" algn="ctr" cap="flat" w="35698">
+                      <a:solidFill>
+                        <a:srgbClr val="000000"/>
+                      </a:solidFill>
+                      <a:prstDash val="solid"/>
+                      <a:round/>
+                      <a:headEnd type="none" w="med" len="med"/>
+                      <a:tailEnd type="none" w="med" len="med"/>
+                    </a:lnL>
+                    <a:lnR cmpd="sng" algn="ctr" cap="flat" w="35698">
+                      <a:solidFill>
+                        <a:srgbClr val="000000"/>
+                      </a:solidFill>
+                      <a:prstDash val="solid"/>
+                      <a:round/>
+                      <a:headEnd type="none" w="med" len="med"/>
+                      <a:tailEnd type="none" w="med" len="med"/>
+                    </a:lnR>
+                    <a:lnT cmpd="sng" algn="ctr" cap="flat" w="35698">
+                      <a:solidFill>
+                        <a:srgbClr val="000000"/>
+                      </a:solidFill>
+                      <a:prstDash val="solid"/>
+                      <a:round/>
+                      <a:headEnd type="none" w="med" len="med"/>
+                      <a:tailEnd type="none" w="med" len="med"/>
+                    </a:lnT>
+                    <a:lnB cmpd="sng" algn="ctr" cap="flat" w="35698">
+                      <a:solidFill>
+                        <a:srgbClr val="000000"/>
+                      </a:solidFill>
+                      <a:prstDash val="solid"/>
+                      <a:round/>
+                      <a:headEnd type="none" w="med" len="med"/>
+                      <a:tailEnd type="none" w="med" len="med"/>
+                    </a:lnB>
+                  </a:tcPr>
+                </a:tc>
+                <a:tc>
+                  <a:txBody>
+                    <a:bodyPr anchor="t" rtlCol="false"/>
+                    <a:lstStyle/>
+                    <a:p>
+                      <a:pPr algn="ctr">
+                        <a:lnSpc>
+                          <a:spcPts val="2900"/>
+                        </a:lnSpc>
+                        <a:defRPr/>
+                      </a:pPr>
+                      <a:r>
+                        <a:rPr lang="en-US" sz="2072">
+                          <a:solidFill>
+                            <a:srgbClr val="3C3C3C"/>
+                          </a:solidFill>
+                          <a:latin typeface="Aileron"/>
+                        </a:rPr>
+                        <a:t>Relu</a:t>
+                      </a:r>
+                      <a:endParaRPr lang="en-US" sz="1100"/>
+                    </a:p>
+                  </a:txBody>
+                  <a:tcPr marL="178488" marR="178488" marT="178488" marB="178488" anchor="ctr">
+                    <a:lnL cmpd="sng" algn="ctr" cap="flat" w="35698">
+                      <a:solidFill>
+                        <a:srgbClr val="000000"/>
+                      </a:solidFill>
+                      <a:prstDash val="solid"/>
+                      <a:round/>
+                      <a:headEnd type="none" w="med" len="med"/>
+                      <a:tailEnd type="none" w="med" len="med"/>
+                    </a:lnL>
+                    <a:lnR cmpd="sng" algn="ctr" cap="flat" w="35698">
+                      <a:solidFill>
+                        <a:srgbClr val="000000"/>
+                      </a:solidFill>
+                      <a:prstDash val="solid"/>
+                      <a:round/>
+                      <a:headEnd type="none" w="med" len="med"/>
+                      <a:tailEnd type="none" w="med" len="med"/>
+                    </a:lnR>
+                    <a:lnT cmpd="sng" algn="ctr" cap="flat" w="35698">
+                      <a:solidFill>
+                        <a:srgbClr val="000000"/>
+                      </a:solidFill>
+                      <a:prstDash val="solid"/>
+                      <a:round/>
+                      <a:headEnd type="none" w="med" len="med"/>
+                      <a:tailEnd type="none" w="med" len="med"/>
+                    </a:lnT>
+                    <a:lnB cmpd="sng" algn="ctr" cap="flat" w="35698">
+                      <a:solidFill>
+                        <a:srgbClr val="000000"/>
+                      </a:solidFill>
+                      <a:prstDash val="solid"/>
+                      <a:round/>
+                      <a:headEnd type="none" w="med" len="med"/>
+                      <a:tailEnd type="none" w="med" len="med"/>
+                    </a:lnB>
+                  </a:tcPr>
+                </a:tc>
+                <a:tc>
+                  <a:txBody>
+                    <a:bodyPr anchor="t" rtlCol="false"/>
+                    <a:lstStyle/>
+                    <a:p>
+                      <a:pPr algn="ctr">
+                        <a:lnSpc>
+                          <a:spcPts val="2900"/>
+                        </a:lnSpc>
+                        <a:defRPr/>
+                      </a:pPr>
+                      <a:r>
+                        <a:rPr lang="en-US" sz="2072">
+                          <a:solidFill>
+                            <a:srgbClr val="3C3C3C"/>
+                          </a:solidFill>
+                          <a:latin typeface="Aileron"/>
+                        </a:rPr>
+                        <a:t>0.008</a:t>
+                      </a:r>
+                      <a:endParaRPr lang="en-US" sz="1100"/>
+                    </a:p>
+                  </a:txBody>
+                  <a:tcPr marL="178488" marR="178488" marT="178488" marB="178488" anchor="ctr">
+                    <a:lnL cmpd="sng" algn="ctr" cap="flat" w="35698">
+                      <a:solidFill>
+                        <a:srgbClr val="000000"/>
+                      </a:solidFill>
+                      <a:prstDash val="solid"/>
+                      <a:round/>
+                      <a:headEnd type="none" w="med" len="med"/>
+                      <a:tailEnd type="none" w="med" len="med"/>
+                    </a:lnL>
+                    <a:lnR cmpd="sng" algn="ctr" cap="flat" w="35698">
+                      <a:solidFill>
+                        <a:srgbClr val="000000"/>
+                      </a:solidFill>
+                      <a:prstDash val="solid"/>
+                      <a:round/>
+                      <a:headEnd type="none" w="med" len="med"/>
+                      <a:tailEnd type="none" w="med" len="med"/>
+                    </a:lnR>
+                    <a:lnT cmpd="sng" algn="ctr" cap="flat" w="35698">
+                      <a:solidFill>
+                        <a:srgbClr val="000000"/>
+                      </a:solidFill>
+                      <a:prstDash val="solid"/>
+                      <a:round/>
+                      <a:headEnd type="none" w="med" len="med"/>
+                      <a:tailEnd type="none" w="med" len="med"/>
+                    </a:lnT>
+                    <a:lnB cmpd="sng" algn="ctr" cap="flat" w="35698">
+                      <a:solidFill>
+                        <a:srgbClr val="000000"/>
+                      </a:solidFill>
+                      <a:prstDash val="solid"/>
+                      <a:round/>
+                      <a:headEnd type="none" w="med" len="med"/>
+                      <a:tailEnd type="none" w="med" len="med"/>
+                    </a:lnB>
+                  </a:tcPr>
+                </a:tc>
+                <a:tc>
+                  <a:txBody>
+                    <a:bodyPr anchor="t" rtlCol="false"/>
+                    <a:lstStyle/>
+                    <a:p>
+                      <a:pPr algn="ctr">
+                        <a:lnSpc>
+                          <a:spcPts val="2900"/>
+                        </a:lnSpc>
+                        <a:defRPr/>
+                      </a:pPr>
+                      <a:r>
+                        <a:rPr lang="en-US" sz="2072">
+                          <a:solidFill>
+                            <a:srgbClr val="3C3C3C"/>
+                          </a:solidFill>
+                          <a:latin typeface="Aileron"/>
+                        </a:rPr>
+                        <a:t>Adam</a:t>
+                      </a:r>
+                      <a:endParaRPr lang="en-US" sz="1100"/>
+                    </a:p>
+                  </a:txBody>
+                  <a:tcPr marL="178488" marR="178488" marT="178488" marB="178488" anchor="ctr">
+                    <a:lnL cmpd="sng" algn="ctr" cap="flat" w="35698">
+                      <a:solidFill>
+                        <a:srgbClr val="000000"/>
+                      </a:solidFill>
+                      <a:prstDash val="solid"/>
+                      <a:round/>
+                      <a:headEnd type="none" w="med" len="med"/>
+                      <a:tailEnd type="none" w="med" len="med"/>
+                    </a:lnL>
+                    <a:lnR cmpd="sng" algn="ctr" cap="flat" w="35698">
+                      <a:solidFill>
+                        <a:srgbClr val="000000"/>
+                      </a:solidFill>
+                      <a:prstDash val="solid"/>
+                      <a:round/>
+                      <a:headEnd type="none" w="med" len="med"/>
+                      <a:tailEnd type="none" w="med" len="med"/>
+                    </a:lnR>
+                    <a:lnT cmpd="sng" algn="ctr" cap="flat" w="35698">
+                      <a:solidFill>
+                        <a:srgbClr val="000000"/>
+                      </a:solidFill>
+                      <a:prstDash val="solid"/>
+                      <a:round/>
+                      <a:headEnd type="none" w="med" len="med"/>
+                      <a:tailEnd type="none" w="med" len="med"/>
+                    </a:lnT>
+                    <a:lnB cmpd="sng" algn="ctr" cap="flat" w="35698">
+                      <a:solidFill>
+                        <a:srgbClr val="000000"/>
+                      </a:solidFill>
+                      <a:prstDash val="solid"/>
+                      <a:round/>
+                      <a:headEnd type="none" w="med" len="med"/>
+                      <a:tailEnd type="none" w="med" len="med"/>
+                    </a:lnB>
+                  </a:tcPr>
+                </a:tc>
+                <a:tc>
+                  <a:txBody>
+                    <a:bodyPr anchor="t" rtlCol="false"/>
+                    <a:lstStyle/>
+                    <a:p>
+                      <a:pPr algn="ctr">
+                        <a:lnSpc>
+                          <a:spcPts val="2900"/>
+                        </a:lnSpc>
+                        <a:defRPr/>
+                      </a:pPr>
+                      <a:r>
+                        <a:rPr lang="en-US" sz="2072">
+                          <a:solidFill>
+                            <a:srgbClr val="3C3C3C"/>
+                          </a:solidFill>
+                          <a:latin typeface="Aileron"/>
+                        </a:rPr>
+                        <a:t>1-e5</a:t>
+                      </a:r>
+                      <a:endParaRPr lang="en-US" sz="1100"/>
+                    </a:p>
+                  </a:txBody>
+                  <a:tcPr marL="178488" marR="178488" marT="178488" marB="178488" anchor="ctr">
+                    <a:lnL cmpd="sng" algn="ctr" cap="flat" w="35698">
+                      <a:solidFill>
+                        <a:srgbClr val="000000"/>
+                      </a:solidFill>
+                      <a:prstDash val="solid"/>
+                      <a:round/>
+                      <a:headEnd type="none" w="med" len="med"/>
+                      <a:tailEnd type="none" w="med" len="med"/>
+                    </a:lnL>
+                    <a:lnR cmpd="sng" algn="ctr" cap="flat" w="35698">
+                      <a:solidFill>
+                        <a:srgbClr val="000000"/>
+                      </a:solidFill>
+                      <a:prstDash val="solid"/>
+                      <a:round/>
+                      <a:headEnd type="none" w="med" len="med"/>
+                      <a:tailEnd type="none" w="med" len="med"/>
+                    </a:lnR>
+                    <a:lnT cmpd="sng" algn="ctr" cap="flat" w="35698">
+                      <a:solidFill>
+                        <a:srgbClr val="000000"/>
+                      </a:solidFill>
+                      <a:prstDash val="solid"/>
+                      <a:round/>
+                      <a:headEnd type="none" w="med" len="med"/>
+                      <a:tailEnd type="none" w="med" len="med"/>
+                    </a:lnT>
+                    <a:lnB cmpd="sng" algn="ctr" cap="flat" w="35698">
+                      <a:solidFill>
+                        <a:srgbClr val="000000"/>
+                      </a:solidFill>
+                      <a:prstDash val="solid"/>
+                      <a:round/>
+                      <a:headEnd type="none" w="med" len="med"/>
+                      <a:tailEnd type="none" w="med" len="med"/>
+                    </a:lnB>
+                  </a:tcPr>
+                </a:tc>
+                <a:tc>
+                  <a:txBody>
+                    <a:bodyPr anchor="t" rtlCol="false"/>
+                    <a:lstStyle/>
+                    <a:p>
+                      <a:pPr algn="ctr">
+                        <a:lnSpc>
+                          <a:spcPts val="2900"/>
+                        </a:lnSpc>
+                        <a:defRPr/>
+                      </a:pPr>
+                      <a:r>
+                        <a:rPr lang="en-US" sz="2072">
+                          <a:solidFill>
+                            <a:srgbClr val="3C3C3C"/>
+                          </a:solidFill>
+                          <a:latin typeface="Aileron"/>
+                        </a:rPr>
+                        <a:t>0.01</a:t>
+                      </a:r>
+                      <a:endParaRPr lang="en-US" sz="1100"/>
+                    </a:p>
+                  </a:txBody>
+                  <a:tcPr marL="178488" marR="178488" marT="178488" marB="178488" anchor="ctr">
+                    <a:lnL cmpd="sng" algn="ctr" cap="flat" w="35698">
+                      <a:solidFill>
+                        <a:srgbClr val="000000"/>
+                      </a:solidFill>
+                      <a:prstDash val="solid"/>
+                      <a:round/>
+                      <a:headEnd type="none" w="med" len="med"/>
+                      <a:tailEnd type="none" w="med" len="med"/>
+                    </a:lnL>
+                    <a:lnR cmpd="sng" algn="ctr" cap="flat" w="35698">
+                      <a:solidFill>
+                        <a:srgbClr val="000000"/>
+                      </a:solidFill>
+                      <a:prstDash val="solid"/>
+                      <a:round/>
+                      <a:headEnd type="none" w="med" len="med"/>
+                      <a:tailEnd type="none" w="med" len="med"/>
+                    </a:lnR>
+                    <a:lnT cmpd="sng" algn="ctr" cap="flat" w="35698">
+                      <a:solidFill>
+                        <a:srgbClr val="000000"/>
+                      </a:solidFill>
+                      <a:prstDash val="solid"/>
+                      <a:round/>
+                      <a:headEnd type="none" w="med" len="med"/>
+                      <a:tailEnd type="none" w="med" len="med"/>
+                    </a:lnT>
+                    <a:lnB cmpd="sng" algn="ctr" cap="flat" w="35698">
+                      <a:solidFill>
+                        <a:srgbClr val="000000"/>
+                      </a:solidFill>
+                      <a:prstDash val="solid"/>
+                      <a:round/>
+                      <a:headEnd type="none" w="med" len="med"/>
+                      <a:tailEnd type="none" w="med" len="med"/>
+                    </a:lnB>
+                  </a:tcPr>
+                </a:tc>
+              </a:tr>
+            </a:tbl>
+          </a:graphicData>
+        </a:graphic>
+      </p:graphicFrame>
+      <p:grpSp>
+        <p:nvGrpSpPr>
+          <p:cNvPr name="Group 6" id="6"/>
+          <p:cNvGrpSpPr/>
+          <p:nvPr/>
+        </p:nvGrpSpPr>
+        <p:grpSpPr>
+          <a:xfrm rot="0">
+            <a:off x="180474" y="4854354"/>
+            <a:ext cx="4515685" cy="967908"/>
+            <a:chOff x="0" y="0"/>
+            <a:chExt cx="907102" cy="194432"/>
+          </a:xfrm>
+        </p:grpSpPr>
+        <p:sp>
+          <p:nvSpPr>
+            <p:cNvPr name="Freeform 7" id="7"/>
+            <p:cNvSpPr/>
+            <p:nvPr/>
+          </p:nvSpPr>
+          <p:spPr>
+            <a:xfrm flipH="false" flipV="false" rot="0">
+              <a:off x="0" y="0"/>
+              <a:ext cx="907102" cy="194432"/>
+            </a:xfrm>
+            <a:custGeom>
+              <a:avLst/>
+              <a:gdLst/>
+              <a:ahLst/>
+              <a:cxnLst/>
+              <a:rect r="r" b="b" t="t" l="l"/>
+              <a:pathLst>
+                <a:path h="194432" w="907102">
+                  <a:moveTo>
+                    <a:pt x="87437" y="0"/>
+                  </a:moveTo>
+                  <a:lnTo>
+                    <a:pt x="819665" y="0"/>
+                  </a:lnTo>
+                  <a:cubicBezTo>
+                    <a:pt x="842855" y="0"/>
+                    <a:pt x="865095" y="9212"/>
+                    <a:pt x="881493" y="25610"/>
+                  </a:cubicBezTo>
+                  <a:cubicBezTo>
+                    <a:pt x="897890" y="42007"/>
+                    <a:pt x="907102" y="64247"/>
+                    <a:pt x="907102" y="87437"/>
+                  </a:cubicBezTo>
+                  <a:lnTo>
+                    <a:pt x="907102" y="106995"/>
+                  </a:lnTo>
+                  <a:cubicBezTo>
+                    <a:pt x="907102" y="130184"/>
+                    <a:pt x="897890" y="152424"/>
+                    <a:pt x="881493" y="168822"/>
+                  </a:cubicBezTo>
+                  <a:cubicBezTo>
+                    <a:pt x="865095" y="185220"/>
+                    <a:pt x="842855" y="194432"/>
+                    <a:pt x="819665" y="194432"/>
+                  </a:cubicBezTo>
+                  <a:lnTo>
+                    <a:pt x="87437" y="194432"/>
+                  </a:lnTo>
+                  <a:cubicBezTo>
+                    <a:pt x="64247" y="194432"/>
+                    <a:pt x="42007" y="185220"/>
+                    <a:pt x="25610" y="168822"/>
+                  </a:cubicBezTo>
+                  <a:cubicBezTo>
+                    <a:pt x="9212" y="152424"/>
+                    <a:pt x="0" y="130184"/>
+                    <a:pt x="0" y="106995"/>
+                  </a:cubicBezTo>
+                  <a:lnTo>
+                    <a:pt x="0" y="87437"/>
+                  </a:lnTo>
+                  <a:cubicBezTo>
+                    <a:pt x="0" y="64247"/>
+                    <a:pt x="9212" y="42007"/>
+                    <a:pt x="25610" y="25610"/>
+                  </a:cubicBezTo>
+                  <a:cubicBezTo>
+                    <a:pt x="42007" y="9212"/>
+                    <a:pt x="64247" y="0"/>
+                    <a:pt x="87437" y="0"/>
+                  </a:cubicBezTo>
+                  <a:close/>
+                </a:path>
+              </a:pathLst>
+            </a:custGeom>
+            <a:solidFill>
+              <a:srgbClr val="F18846"/>
+            </a:solidFill>
+          </p:spPr>
+        </p:sp>
+        <p:sp>
+          <p:nvSpPr>
+            <p:cNvPr name="TextBox 8" id="8"/>
+            <p:cNvSpPr txBox="true"/>
+            <p:nvPr/>
+          </p:nvSpPr>
+          <p:spPr>
+            <a:xfrm>
+              <a:off x="0" y="-57150"/>
+              <a:ext cx="907102" cy="251582"/>
+            </a:xfrm>
+            <a:prstGeom prst="rect">
+              <a:avLst/>
+            </a:prstGeom>
+          </p:spPr>
+          <p:txBody>
+            <a:bodyPr anchor="ctr" rtlCol="false" tIns="50800" lIns="50800" bIns="50800" rIns="50800"/>
+            <a:lstStyle/>
+            <a:p>
+              <a:pPr algn="ctr">
+                <a:lnSpc>
+                  <a:spcPts val="3418"/>
+                </a:lnSpc>
+              </a:pPr>
+            </a:p>
+          </p:txBody>
+        </p:sp>
+      </p:grpSp>
+      <p:sp>
+        <p:nvSpPr>
+          <p:cNvPr name="TextBox 9" id="9"/>
           <p:cNvSpPr txBox="true"/>
           <p:nvPr/>
         </p:nvSpPr>
         <p:spPr>
           <a:xfrm rot="0">
-            <a:off x="3025289" y="4444815"/>
-            <a:ext cx="4300881" cy="377825"/>
+            <a:off x="421029" y="5040833"/>
+            <a:ext cx="4856656" cy="537799"/>
           </a:xfrm>
           <a:prstGeom prst="rect">
             <a:avLst/>
@@ -10125,95 +13629,19 @@
           </a:bodyPr>
           <a:lstStyle/>
           <a:p>
-            <a:pPr algn="ctr">
+            <a:pPr>
               <a:lnSpc>
-                <a:spcPts val="2949"/>
+                <a:spcPts val="4482"/>
               </a:lnSpc>
             </a:pPr>
             <a:r>
-              <a:rPr lang="en-US" sz="2499">
+              <a:rPr lang="en-US" sz="3201">
                 <a:solidFill>
                   <a:srgbClr val="3C3C3C"/>
                 </a:solidFill>
-                <a:latin typeface="Montserrat Classic Bold Italics"/>
+                <a:latin typeface="Aileron Bold"/>
               </a:rPr>
-              <a:t>Average Accuracy : 0.8245 </a:t>
-            </a:r>
-          </a:p>
-        </p:txBody>
-      </p:sp>
-      <p:sp>
-        <p:nvSpPr>
-          <p:cNvPr name="TextBox 14" id="14"/>
-          <p:cNvSpPr txBox="true"/>
-          <p:nvPr/>
-        </p:nvSpPr>
-        <p:spPr>
-          <a:xfrm rot="0">
-            <a:off x="10567813" y="3550202"/>
-            <a:ext cx="5088915" cy="697425"/>
-          </a:xfrm>
-          <a:prstGeom prst="rect">
-            <a:avLst/>
-          </a:prstGeom>
-        </p:spPr>
-        <p:txBody>
-          <a:bodyPr anchor="t" rtlCol="false" tIns="0" lIns="0" bIns="0" rIns="0">
-            <a:spAutoFit/>
-          </a:bodyPr>
-          <a:lstStyle/>
-          <a:p>
-            <a:pPr algn="ctr">
-              <a:lnSpc>
-                <a:spcPts val="5400"/>
-              </a:lnSpc>
-            </a:pPr>
-            <a:r>
-              <a:rPr lang="en-US" sz="4576">
-                <a:solidFill>
-                  <a:srgbClr val="CA5E28"/>
-                </a:solidFill>
-                <a:latin typeface="Montserrat Classic Bold"/>
-              </a:rPr>
-              <a:t>LSTM</a:t>
-            </a:r>
-          </a:p>
-        </p:txBody>
-      </p:sp>
-      <p:sp>
-        <p:nvSpPr>
-          <p:cNvPr name="TextBox 15" id="15"/>
-          <p:cNvSpPr txBox="true"/>
-          <p:nvPr/>
-        </p:nvSpPr>
-        <p:spPr>
-          <a:xfrm rot="0">
-            <a:off x="11067131" y="4444815"/>
-            <a:ext cx="4090278" cy="377825"/>
-          </a:xfrm>
-          <a:prstGeom prst="rect">
-            <a:avLst/>
-          </a:prstGeom>
-        </p:spPr>
-        <p:txBody>
-          <a:bodyPr anchor="t" rtlCol="false" tIns="0" lIns="0" bIns="0" rIns="0">
-            <a:spAutoFit/>
-          </a:bodyPr>
-          <a:lstStyle/>
-          <a:p>
-            <a:pPr algn="ctr">
-              <a:lnSpc>
-                <a:spcPts val="2949"/>
-              </a:lnSpc>
-            </a:pPr>
-            <a:r>
-              <a:rPr lang="en-US" sz="2499">
-                <a:solidFill>
-                  <a:srgbClr val="3C3C3C"/>
-                </a:solidFill>
-                <a:latin typeface="Montserrat Classic Bold Italics"/>
-              </a:rPr>
-              <a:t>Average Accuracy :  0.91</a:t>
+              <a:t>Model Development</a:t>
             </a:r>
           </a:p>
         </p:txBody>

</xml_diff>